<commit_message>
Add Framework provided services
</commit_message>
<xml_diff>
--- a/Host&Startup&Di.pptx
+++ b/Host&Startup&Di.pptx
@@ -5,7 +5,7 @@
     <p:sldMasterId id="2147483648" r:id="rId1"/>
   </p:sldMasterIdLst>
   <p:notesMasterIdLst>
-    <p:notesMasterId r:id="rId13"/>
+    <p:notesMasterId r:id="rId22"/>
   </p:notesMasterIdLst>
   <p:sldIdLst>
     <p:sldId id="256" r:id="rId2"/>
@@ -18,7 +18,16 @@
     <p:sldId id="336" r:id="rId9"/>
     <p:sldId id="337" r:id="rId10"/>
     <p:sldId id="338" r:id="rId11"/>
-    <p:sldId id="330" r:id="rId12"/>
+    <p:sldId id="339" r:id="rId12"/>
+    <p:sldId id="340" r:id="rId13"/>
+    <p:sldId id="341" r:id="rId14"/>
+    <p:sldId id="342" r:id="rId15"/>
+    <p:sldId id="343" r:id="rId16"/>
+    <p:sldId id="344" r:id="rId17"/>
+    <p:sldId id="345" r:id="rId18"/>
+    <p:sldId id="346" r:id="rId19"/>
+    <p:sldId id="347" r:id="rId20"/>
+    <p:sldId id="330" r:id="rId21"/>
   </p:sldIdLst>
   <p:sldSz cx="12192000" cy="6858000"/>
   <p:notesSz cx="6858000" cy="9144000"/>
@@ -207,7 +216,7 @@
           <a:p>
             <a:fld id="{1747B90C-FE49-44DE-93E7-FA9DDECBEA03}" type="datetimeFigureOut">
               <a:rPr lang="en-US" smtClean="0"/>
-              <a:t>25-Nov-19</a:t>
+              <a:t>11/26/2019</a:t>
             </a:fld>
             <a:endParaRPr lang="en-US"/>
           </a:p>
@@ -271,38 +280,37 @@
           <a:p>
             <a:pPr lvl="0"/>
             <a:r>
-              <a:rPr lang="en-US" smtClean="0"/>
+              <a:rPr lang="en-US"/>
               <a:t>Edit Master text styles</a:t>
             </a:r>
           </a:p>
           <a:p>
             <a:pPr lvl="1"/>
             <a:r>
-              <a:rPr lang="en-US" smtClean="0"/>
+              <a:rPr lang="en-US"/>
               <a:t>Second level</a:t>
             </a:r>
           </a:p>
           <a:p>
             <a:pPr lvl="2"/>
             <a:r>
-              <a:rPr lang="en-US" smtClean="0"/>
+              <a:rPr lang="en-US"/>
               <a:t>Third level</a:t>
             </a:r>
           </a:p>
           <a:p>
             <a:pPr lvl="3"/>
             <a:r>
-              <a:rPr lang="en-US" smtClean="0"/>
+              <a:rPr lang="en-US"/>
               <a:t>Fourth level</a:t>
             </a:r>
           </a:p>
           <a:p>
             <a:pPr lvl="4"/>
             <a:r>
-              <a:rPr lang="en-US" smtClean="0"/>
+              <a:rPr lang="en-US"/>
               <a:t>Fifth level</a:t>
             </a:r>
-            <a:endParaRPr lang="en-US"/>
           </a:p>
         </p:txBody>
       </p:sp>
@@ -559,6 +567,734 @@
 </p:notes>
 </file>
 
+<file path=ppt/notesSlides/notesSlide10.xml><?xml version="1.0" encoding="utf-8"?>
+<p:notes xmlns:a="http://schemas.openxmlformats.org/drawingml/2006/main" xmlns:r="http://schemas.openxmlformats.org/officeDocument/2006/relationships" xmlns:p="http://schemas.openxmlformats.org/presentationml/2006/main">
+  <p:cSld>
+    <p:spTree>
+      <p:nvGrpSpPr>
+        <p:cNvPr id="1" name=""/>
+        <p:cNvGrpSpPr/>
+        <p:nvPr/>
+      </p:nvGrpSpPr>
+      <p:grpSpPr>
+        <a:xfrm>
+          <a:off x="0" y="0"/>
+          <a:ext cx="0" cy="0"/>
+          <a:chOff x="0" y="0"/>
+          <a:chExt cx="0" cy="0"/>
+        </a:xfrm>
+      </p:grpSpPr>
+      <p:sp>
+        <p:nvSpPr>
+          <p:cNvPr id="2" name="Slide Image Placeholder 1"/>
+          <p:cNvSpPr>
+            <a:spLocks noGrp="1" noRot="1" noChangeAspect="1"/>
+          </p:cNvSpPr>
+          <p:nvPr>
+            <p:ph type="sldImg"/>
+          </p:nvPr>
+        </p:nvSpPr>
+        <p:spPr/>
+      </p:sp>
+      <p:sp>
+        <p:nvSpPr>
+          <p:cNvPr id="3" name="Notes Placeholder 2"/>
+          <p:cNvSpPr>
+            <a:spLocks noGrp="1"/>
+          </p:cNvSpPr>
+          <p:nvPr>
+            <p:ph type="body" idx="1"/>
+          </p:nvPr>
+        </p:nvSpPr>
+        <p:spPr/>
+        <p:txBody>
+          <a:bodyPr/>
+          <a:lstStyle/>
+          <a:p>
+            <a:endParaRPr lang="ru-RU" sz="1200" b="0" i="0" kern="1200" dirty="0">
+              <a:solidFill>
+                <a:schemeClr val="tx1"/>
+              </a:solidFill>
+              <a:effectLst/>
+              <a:latin typeface="+mn-lt"/>
+              <a:ea typeface="+mn-ea"/>
+              <a:cs typeface="+mn-cs"/>
+            </a:endParaRPr>
+          </a:p>
+        </p:txBody>
+      </p:sp>
+      <p:sp>
+        <p:nvSpPr>
+          <p:cNvPr id="4" name="Slide Number Placeholder 3"/>
+          <p:cNvSpPr>
+            <a:spLocks noGrp="1"/>
+          </p:cNvSpPr>
+          <p:nvPr>
+            <p:ph type="sldNum" sz="quarter" idx="10"/>
+          </p:nvPr>
+        </p:nvSpPr>
+        <p:spPr/>
+        <p:txBody>
+          <a:bodyPr/>
+          <a:lstStyle/>
+          <a:p>
+            <a:fld id="{BA1D5B97-ACF5-4677-A104-92B2393AA446}" type="slidenum">
+              <a:rPr lang="en-US" smtClean="0"/>
+              <a:t>13</a:t>
+            </a:fld>
+            <a:endParaRPr lang="en-US"/>
+          </a:p>
+        </p:txBody>
+      </p:sp>
+    </p:spTree>
+    <p:extLst>
+      <p:ext uri="{BB962C8B-B14F-4D97-AF65-F5344CB8AC3E}">
+        <p14:creationId xmlns:p14="http://schemas.microsoft.com/office/powerpoint/2010/main" val="2494106105"/>
+      </p:ext>
+    </p:extLst>
+  </p:cSld>
+  <p:clrMapOvr>
+    <a:masterClrMapping/>
+  </p:clrMapOvr>
+</p:notes>
+</file>
+
+<file path=ppt/notesSlides/notesSlide11.xml><?xml version="1.0" encoding="utf-8"?>
+<p:notes xmlns:a="http://schemas.openxmlformats.org/drawingml/2006/main" xmlns:r="http://schemas.openxmlformats.org/officeDocument/2006/relationships" xmlns:p="http://schemas.openxmlformats.org/presentationml/2006/main">
+  <p:cSld>
+    <p:spTree>
+      <p:nvGrpSpPr>
+        <p:cNvPr id="1" name=""/>
+        <p:cNvGrpSpPr/>
+        <p:nvPr/>
+      </p:nvGrpSpPr>
+      <p:grpSpPr>
+        <a:xfrm>
+          <a:off x="0" y="0"/>
+          <a:ext cx="0" cy="0"/>
+          <a:chOff x="0" y="0"/>
+          <a:chExt cx="0" cy="0"/>
+        </a:xfrm>
+      </p:grpSpPr>
+      <p:sp>
+        <p:nvSpPr>
+          <p:cNvPr id="2" name="Slide Image Placeholder 1"/>
+          <p:cNvSpPr>
+            <a:spLocks noGrp="1" noRot="1" noChangeAspect="1"/>
+          </p:cNvSpPr>
+          <p:nvPr>
+            <p:ph type="sldImg"/>
+          </p:nvPr>
+        </p:nvSpPr>
+        <p:spPr/>
+      </p:sp>
+      <p:sp>
+        <p:nvSpPr>
+          <p:cNvPr id="3" name="Notes Placeholder 2"/>
+          <p:cNvSpPr>
+            <a:spLocks noGrp="1"/>
+          </p:cNvSpPr>
+          <p:nvPr>
+            <p:ph type="body" idx="1"/>
+          </p:nvPr>
+        </p:nvSpPr>
+        <p:spPr/>
+        <p:txBody>
+          <a:bodyPr/>
+          <a:lstStyle/>
+          <a:p>
+            <a:endParaRPr lang="ru-RU" sz="1200" b="0" i="0" kern="1200" dirty="0">
+              <a:solidFill>
+                <a:schemeClr val="tx1"/>
+              </a:solidFill>
+              <a:effectLst/>
+              <a:latin typeface="+mn-lt"/>
+              <a:ea typeface="+mn-ea"/>
+              <a:cs typeface="+mn-cs"/>
+            </a:endParaRPr>
+          </a:p>
+        </p:txBody>
+      </p:sp>
+      <p:sp>
+        <p:nvSpPr>
+          <p:cNvPr id="4" name="Slide Number Placeholder 3"/>
+          <p:cNvSpPr>
+            <a:spLocks noGrp="1"/>
+          </p:cNvSpPr>
+          <p:nvPr>
+            <p:ph type="sldNum" sz="quarter" idx="10"/>
+          </p:nvPr>
+        </p:nvSpPr>
+        <p:spPr/>
+        <p:txBody>
+          <a:bodyPr/>
+          <a:lstStyle/>
+          <a:p>
+            <a:fld id="{BA1D5B97-ACF5-4677-A104-92B2393AA446}" type="slidenum">
+              <a:rPr lang="en-US" smtClean="0"/>
+              <a:t>14</a:t>
+            </a:fld>
+            <a:endParaRPr lang="en-US"/>
+          </a:p>
+        </p:txBody>
+      </p:sp>
+    </p:spTree>
+    <p:extLst>
+      <p:ext uri="{BB962C8B-B14F-4D97-AF65-F5344CB8AC3E}">
+        <p14:creationId xmlns:p14="http://schemas.microsoft.com/office/powerpoint/2010/main" val="3560926255"/>
+      </p:ext>
+    </p:extLst>
+  </p:cSld>
+  <p:clrMapOvr>
+    <a:masterClrMapping/>
+  </p:clrMapOvr>
+</p:notes>
+</file>
+
+<file path=ppt/notesSlides/notesSlide12.xml><?xml version="1.0" encoding="utf-8"?>
+<p:notes xmlns:a="http://schemas.openxmlformats.org/drawingml/2006/main" xmlns:r="http://schemas.openxmlformats.org/officeDocument/2006/relationships" xmlns:p="http://schemas.openxmlformats.org/presentationml/2006/main">
+  <p:cSld>
+    <p:spTree>
+      <p:nvGrpSpPr>
+        <p:cNvPr id="1" name=""/>
+        <p:cNvGrpSpPr/>
+        <p:nvPr/>
+      </p:nvGrpSpPr>
+      <p:grpSpPr>
+        <a:xfrm>
+          <a:off x="0" y="0"/>
+          <a:ext cx="0" cy="0"/>
+          <a:chOff x="0" y="0"/>
+          <a:chExt cx="0" cy="0"/>
+        </a:xfrm>
+      </p:grpSpPr>
+      <p:sp>
+        <p:nvSpPr>
+          <p:cNvPr id="2" name="Slide Image Placeholder 1"/>
+          <p:cNvSpPr>
+            <a:spLocks noGrp="1" noRot="1" noChangeAspect="1"/>
+          </p:cNvSpPr>
+          <p:nvPr>
+            <p:ph type="sldImg"/>
+          </p:nvPr>
+        </p:nvSpPr>
+        <p:spPr/>
+      </p:sp>
+      <p:sp>
+        <p:nvSpPr>
+          <p:cNvPr id="3" name="Notes Placeholder 2"/>
+          <p:cNvSpPr>
+            <a:spLocks noGrp="1"/>
+          </p:cNvSpPr>
+          <p:nvPr>
+            <p:ph type="body" idx="1"/>
+          </p:nvPr>
+        </p:nvSpPr>
+        <p:spPr/>
+        <p:txBody>
+          <a:bodyPr/>
+          <a:lstStyle/>
+          <a:p>
+            <a:endParaRPr lang="ru-RU" sz="1200" b="0" i="0" kern="1200" dirty="0">
+              <a:solidFill>
+                <a:schemeClr val="tx1"/>
+              </a:solidFill>
+              <a:effectLst/>
+              <a:latin typeface="+mn-lt"/>
+              <a:ea typeface="+mn-ea"/>
+              <a:cs typeface="+mn-cs"/>
+            </a:endParaRPr>
+          </a:p>
+        </p:txBody>
+      </p:sp>
+      <p:sp>
+        <p:nvSpPr>
+          <p:cNvPr id="4" name="Slide Number Placeholder 3"/>
+          <p:cNvSpPr>
+            <a:spLocks noGrp="1"/>
+          </p:cNvSpPr>
+          <p:nvPr>
+            <p:ph type="sldNum" sz="quarter" idx="10"/>
+          </p:nvPr>
+        </p:nvSpPr>
+        <p:spPr/>
+        <p:txBody>
+          <a:bodyPr/>
+          <a:lstStyle/>
+          <a:p>
+            <a:fld id="{BA1D5B97-ACF5-4677-A104-92B2393AA446}" type="slidenum">
+              <a:rPr lang="en-US" smtClean="0"/>
+              <a:t>15</a:t>
+            </a:fld>
+            <a:endParaRPr lang="en-US"/>
+          </a:p>
+        </p:txBody>
+      </p:sp>
+    </p:spTree>
+    <p:extLst>
+      <p:ext uri="{BB962C8B-B14F-4D97-AF65-F5344CB8AC3E}">
+        <p14:creationId xmlns:p14="http://schemas.microsoft.com/office/powerpoint/2010/main" val="422264265"/>
+      </p:ext>
+    </p:extLst>
+  </p:cSld>
+  <p:clrMapOvr>
+    <a:masterClrMapping/>
+  </p:clrMapOvr>
+</p:notes>
+</file>
+
+<file path=ppt/notesSlides/notesSlide13.xml><?xml version="1.0" encoding="utf-8"?>
+<p:notes xmlns:a="http://schemas.openxmlformats.org/drawingml/2006/main" xmlns:r="http://schemas.openxmlformats.org/officeDocument/2006/relationships" xmlns:p="http://schemas.openxmlformats.org/presentationml/2006/main">
+  <p:cSld>
+    <p:spTree>
+      <p:nvGrpSpPr>
+        <p:cNvPr id="1" name=""/>
+        <p:cNvGrpSpPr/>
+        <p:nvPr/>
+      </p:nvGrpSpPr>
+      <p:grpSpPr>
+        <a:xfrm>
+          <a:off x="0" y="0"/>
+          <a:ext cx="0" cy="0"/>
+          <a:chOff x="0" y="0"/>
+          <a:chExt cx="0" cy="0"/>
+        </a:xfrm>
+      </p:grpSpPr>
+      <p:sp>
+        <p:nvSpPr>
+          <p:cNvPr id="2" name="Slide Image Placeholder 1"/>
+          <p:cNvSpPr>
+            <a:spLocks noGrp="1" noRot="1" noChangeAspect="1"/>
+          </p:cNvSpPr>
+          <p:nvPr>
+            <p:ph type="sldImg"/>
+          </p:nvPr>
+        </p:nvSpPr>
+        <p:spPr/>
+      </p:sp>
+      <p:sp>
+        <p:nvSpPr>
+          <p:cNvPr id="3" name="Notes Placeholder 2"/>
+          <p:cNvSpPr>
+            <a:spLocks noGrp="1"/>
+          </p:cNvSpPr>
+          <p:nvPr>
+            <p:ph type="body" idx="1"/>
+          </p:nvPr>
+        </p:nvSpPr>
+        <p:spPr/>
+        <p:txBody>
+          <a:bodyPr/>
+          <a:lstStyle/>
+          <a:p>
+            <a:endParaRPr lang="ru-RU" sz="1200" b="0" i="0" kern="1200" dirty="0">
+              <a:solidFill>
+                <a:schemeClr val="tx1"/>
+              </a:solidFill>
+              <a:effectLst/>
+              <a:latin typeface="+mn-lt"/>
+              <a:ea typeface="+mn-ea"/>
+              <a:cs typeface="+mn-cs"/>
+            </a:endParaRPr>
+          </a:p>
+        </p:txBody>
+      </p:sp>
+      <p:sp>
+        <p:nvSpPr>
+          <p:cNvPr id="4" name="Slide Number Placeholder 3"/>
+          <p:cNvSpPr>
+            <a:spLocks noGrp="1"/>
+          </p:cNvSpPr>
+          <p:nvPr>
+            <p:ph type="sldNum" sz="quarter" idx="10"/>
+          </p:nvPr>
+        </p:nvSpPr>
+        <p:spPr/>
+        <p:txBody>
+          <a:bodyPr/>
+          <a:lstStyle/>
+          <a:p>
+            <a:fld id="{BA1D5B97-ACF5-4677-A104-92B2393AA446}" type="slidenum">
+              <a:rPr lang="en-US" smtClean="0"/>
+              <a:t>16</a:t>
+            </a:fld>
+            <a:endParaRPr lang="en-US"/>
+          </a:p>
+        </p:txBody>
+      </p:sp>
+    </p:spTree>
+    <p:extLst>
+      <p:ext uri="{BB962C8B-B14F-4D97-AF65-F5344CB8AC3E}">
+        <p14:creationId xmlns:p14="http://schemas.microsoft.com/office/powerpoint/2010/main" val="4004594608"/>
+      </p:ext>
+    </p:extLst>
+  </p:cSld>
+  <p:clrMapOvr>
+    <a:masterClrMapping/>
+  </p:clrMapOvr>
+</p:notes>
+</file>
+
+<file path=ppt/notesSlides/notesSlide14.xml><?xml version="1.0" encoding="utf-8"?>
+<p:notes xmlns:a="http://schemas.openxmlformats.org/drawingml/2006/main" xmlns:r="http://schemas.openxmlformats.org/officeDocument/2006/relationships" xmlns:p="http://schemas.openxmlformats.org/presentationml/2006/main">
+  <p:cSld>
+    <p:spTree>
+      <p:nvGrpSpPr>
+        <p:cNvPr id="1" name=""/>
+        <p:cNvGrpSpPr/>
+        <p:nvPr/>
+      </p:nvGrpSpPr>
+      <p:grpSpPr>
+        <a:xfrm>
+          <a:off x="0" y="0"/>
+          <a:ext cx="0" cy="0"/>
+          <a:chOff x="0" y="0"/>
+          <a:chExt cx="0" cy="0"/>
+        </a:xfrm>
+      </p:grpSpPr>
+      <p:sp>
+        <p:nvSpPr>
+          <p:cNvPr id="2" name="Slide Image Placeholder 1"/>
+          <p:cNvSpPr>
+            <a:spLocks noGrp="1" noRot="1" noChangeAspect="1"/>
+          </p:cNvSpPr>
+          <p:nvPr>
+            <p:ph type="sldImg"/>
+          </p:nvPr>
+        </p:nvSpPr>
+        <p:spPr/>
+      </p:sp>
+      <p:sp>
+        <p:nvSpPr>
+          <p:cNvPr id="3" name="Notes Placeholder 2"/>
+          <p:cNvSpPr>
+            <a:spLocks noGrp="1"/>
+          </p:cNvSpPr>
+          <p:nvPr>
+            <p:ph type="body" idx="1"/>
+          </p:nvPr>
+        </p:nvSpPr>
+        <p:spPr/>
+        <p:txBody>
+          <a:bodyPr/>
+          <a:lstStyle/>
+          <a:p>
+            <a:endParaRPr lang="ru-RU" sz="1200" b="0" i="0" kern="1200" dirty="0">
+              <a:solidFill>
+                <a:schemeClr val="tx1"/>
+              </a:solidFill>
+              <a:effectLst/>
+              <a:latin typeface="+mn-lt"/>
+              <a:ea typeface="+mn-ea"/>
+              <a:cs typeface="+mn-cs"/>
+            </a:endParaRPr>
+          </a:p>
+        </p:txBody>
+      </p:sp>
+      <p:sp>
+        <p:nvSpPr>
+          <p:cNvPr id="4" name="Slide Number Placeholder 3"/>
+          <p:cNvSpPr>
+            <a:spLocks noGrp="1"/>
+          </p:cNvSpPr>
+          <p:nvPr>
+            <p:ph type="sldNum" sz="quarter" idx="10"/>
+          </p:nvPr>
+        </p:nvSpPr>
+        <p:spPr/>
+        <p:txBody>
+          <a:bodyPr/>
+          <a:lstStyle/>
+          <a:p>
+            <a:fld id="{BA1D5B97-ACF5-4677-A104-92B2393AA446}" type="slidenum">
+              <a:rPr lang="en-US" smtClean="0"/>
+              <a:t>17</a:t>
+            </a:fld>
+            <a:endParaRPr lang="en-US"/>
+          </a:p>
+        </p:txBody>
+      </p:sp>
+    </p:spTree>
+    <p:extLst>
+      <p:ext uri="{BB962C8B-B14F-4D97-AF65-F5344CB8AC3E}">
+        <p14:creationId xmlns:p14="http://schemas.microsoft.com/office/powerpoint/2010/main" val="56024701"/>
+      </p:ext>
+    </p:extLst>
+  </p:cSld>
+  <p:clrMapOvr>
+    <a:masterClrMapping/>
+  </p:clrMapOvr>
+</p:notes>
+</file>
+
+<file path=ppt/notesSlides/notesSlide15.xml><?xml version="1.0" encoding="utf-8"?>
+<p:notes xmlns:a="http://schemas.openxmlformats.org/drawingml/2006/main" xmlns:r="http://schemas.openxmlformats.org/officeDocument/2006/relationships" xmlns:p="http://schemas.openxmlformats.org/presentationml/2006/main">
+  <p:cSld>
+    <p:spTree>
+      <p:nvGrpSpPr>
+        <p:cNvPr id="1" name=""/>
+        <p:cNvGrpSpPr/>
+        <p:nvPr/>
+      </p:nvGrpSpPr>
+      <p:grpSpPr>
+        <a:xfrm>
+          <a:off x="0" y="0"/>
+          <a:ext cx="0" cy="0"/>
+          <a:chOff x="0" y="0"/>
+          <a:chExt cx="0" cy="0"/>
+        </a:xfrm>
+      </p:grpSpPr>
+      <p:sp>
+        <p:nvSpPr>
+          <p:cNvPr id="2" name="Slide Image Placeholder 1"/>
+          <p:cNvSpPr>
+            <a:spLocks noGrp="1" noRot="1" noChangeAspect="1"/>
+          </p:cNvSpPr>
+          <p:nvPr>
+            <p:ph type="sldImg"/>
+          </p:nvPr>
+        </p:nvSpPr>
+        <p:spPr/>
+      </p:sp>
+      <p:sp>
+        <p:nvSpPr>
+          <p:cNvPr id="3" name="Notes Placeholder 2"/>
+          <p:cNvSpPr>
+            <a:spLocks noGrp="1"/>
+          </p:cNvSpPr>
+          <p:nvPr>
+            <p:ph type="body" idx="1"/>
+          </p:nvPr>
+        </p:nvSpPr>
+        <p:spPr/>
+        <p:txBody>
+          <a:bodyPr/>
+          <a:lstStyle/>
+          <a:p>
+            <a:endParaRPr lang="ru-RU" sz="1200" b="0" i="0" kern="1200" dirty="0">
+              <a:solidFill>
+                <a:schemeClr val="tx1"/>
+              </a:solidFill>
+              <a:effectLst/>
+              <a:latin typeface="+mn-lt"/>
+              <a:ea typeface="+mn-ea"/>
+              <a:cs typeface="+mn-cs"/>
+            </a:endParaRPr>
+          </a:p>
+        </p:txBody>
+      </p:sp>
+      <p:sp>
+        <p:nvSpPr>
+          <p:cNvPr id="4" name="Slide Number Placeholder 3"/>
+          <p:cNvSpPr>
+            <a:spLocks noGrp="1"/>
+          </p:cNvSpPr>
+          <p:nvPr>
+            <p:ph type="sldNum" sz="quarter" idx="10"/>
+          </p:nvPr>
+        </p:nvSpPr>
+        <p:spPr/>
+        <p:txBody>
+          <a:bodyPr/>
+          <a:lstStyle/>
+          <a:p>
+            <a:fld id="{BA1D5B97-ACF5-4677-A104-92B2393AA446}" type="slidenum">
+              <a:rPr lang="en-US" smtClean="0"/>
+              <a:t>18</a:t>
+            </a:fld>
+            <a:endParaRPr lang="en-US"/>
+          </a:p>
+        </p:txBody>
+      </p:sp>
+    </p:spTree>
+    <p:extLst>
+      <p:ext uri="{BB962C8B-B14F-4D97-AF65-F5344CB8AC3E}">
+        <p14:creationId xmlns:p14="http://schemas.microsoft.com/office/powerpoint/2010/main" val="4227620592"/>
+      </p:ext>
+    </p:extLst>
+  </p:cSld>
+  <p:clrMapOvr>
+    <a:masterClrMapping/>
+  </p:clrMapOvr>
+</p:notes>
+</file>
+
+<file path=ppt/notesSlides/notesSlide16.xml><?xml version="1.0" encoding="utf-8"?>
+<p:notes xmlns:a="http://schemas.openxmlformats.org/drawingml/2006/main" xmlns:r="http://schemas.openxmlformats.org/officeDocument/2006/relationships" xmlns:p="http://schemas.openxmlformats.org/presentationml/2006/main">
+  <p:cSld>
+    <p:spTree>
+      <p:nvGrpSpPr>
+        <p:cNvPr id="1" name=""/>
+        <p:cNvGrpSpPr/>
+        <p:nvPr/>
+      </p:nvGrpSpPr>
+      <p:grpSpPr>
+        <a:xfrm>
+          <a:off x="0" y="0"/>
+          <a:ext cx="0" cy="0"/>
+          <a:chOff x="0" y="0"/>
+          <a:chExt cx="0" cy="0"/>
+        </a:xfrm>
+      </p:grpSpPr>
+      <p:sp>
+        <p:nvSpPr>
+          <p:cNvPr id="2" name="Slide Image Placeholder 1"/>
+          <p:cNvSpPr>
+            <a:spLocks noGrp="1" noRot="1" noChangeAspect="1"/>
+          </p:cNvSpPr>
+          <p:nvPr>
+            <p:ph type="sldImg"/>
+          </p:nvPr>
+        </p:nvSpPr>
+        <p:spPr/>
+      </p:sp>
+      <p:sp>
+        <p:nvSpPr>
+          <p:cNvPr id="3" name="Notes Placeholder 2"/>
+          <p:cNvSpPr>
+            <a:spLocks noGrp="1"/>
+          </p:cNvSpPr>
+          <p:nvPr>
+            <p:ph type="body" idx="1"/>
+          </p:nvPr>
+        </p:nvSpPr>
+        <p:spPr/>
+        <p:txBody>
+          <a:bodyPr/>
+          <a:lstStyle/>
+          <a:p>
+            <a:endParaRPr lang="ru-RU" sz="1200" b="0" i="0" kern="1200" dirty="0">
+              <a:solidFill>
+                <a:schemeClr val="tx1"/>
+              </a:solidFill>
+              <a:effectLst/>
+              <a:latin typeface="+mn-lt"/>
+              <a:ea typeface="+mn-ea"/>
+              <a:cs typeface="+mn-cs"/>
+            </a:endParaRPr>
+          </a:p>
+        </p:txBody>
+      </p:sp>
+      <p:sp>
+        <p:nvSpPr>
+          <p:cNvPr id="4" name="Slide Number Placeholder 3"/>
+          <p:cNvSpPr>
+            <a:spLocks noGrp="1"/>
+          </p:cNvSpPr>
+          <p:nvPr>
+            <p:ph type="sldNum" sz="quarter" idx="10"/>
+          </p:nvPr>
+        </p:nvSpPr>
+        <p:spPr/>
+        <p:txBody>
+          <a:bodyPr/>
+          <a:lstStyle/>
+          <a:p>
+            <a:fld id="{BA1D5B97-ACF5-4677-A104-92B2393AA446}" type="slidenum">
+              <a:rPr lang="en-US" smtClean="0"/>
+              <a:t>19</a:t>
+            </a:fld>
+            <a:endParaRPr lang="en-US"/>
+          </a:p>
+        </p:txBody>
+      </p:sp>
+    </p:spTree>
+    <p:extLst>
+      <p:ext uri="{BB962C8B-B14F-4D97-AF65-F5344CB8AC3E}">
+        <p14:creationId xmlns:p14="http://schemas.microsoft.com/office/powerpoint/2010/main" val="3068647632"/>
+      </p:ext>
+    </p:extLst>
+  </p:cSld>
+  <p:clrMapOvr>
+    <a:masterClrMapping/>
+  </p:clrMapOvr>
+</p:notes>
+</file>
+
+<file path=ppt/notesSlides/notesSlide17.xml><?xml version="1.0" encoding="utf-8"?>
+<p:notes xmlns:a="http://schemas.openxmlformats.org/drawingml/2006/main" xmlns:r="http://schemas.openxmlformats.org/officeDocument/2006/relationships" xmlns:p="http://schemas.openxmlformats.org/presentationml/2006/main">
+  <p:cSld>
+    <p:spTree>
+      <p:nvGrpSpPr>
+        <p:cNvPr id="1" name=""/>
+        <p:cNvGrpSpPr/>
+        <p:nvPr/>
+      </p:nvGrpSpPr>
+      <p:grpSpPr>
+        <a:xfrm>
+          <a:off x="0" y="0"/>
+          <a:ext cx="0" cy="0"/>
+          <a:chOff x="0" y="0"/>
+          <a:chExt cx="0" cy="0"/>
+        </a:xfrm>
+      </p:grpSpPr>
+      <p:sp>
+        <p:nvSpPr>
+          <p:cNvPr id="2" name="Slide Image Placeholder 1"/>
+          <p:cNvSpPr>
+            <a:spLocks noGrp="1" noRot="1" noChangeAspect="1"/>
+          </p:cNvSpPr>
+          <p:nvPr>
+            <p:ph type="sldImg"/>
+          </p:nvPr>
+        </p:nvSpPr>
+        <p:spPr/>
+      </p:sp>
+      <p:sp>
+        <p:nvSpPr>
+          <p:cNvPr id="3" name="Notes Placeholder 2"/>
+          <p:cNvSpPr>
+            <a:spLocks noGrp="1"/>
+          </p:cNvSpPr>
+          <p:nvPr>
+            <p:ph type="body" idx="1"/>
+          </p:nvPr>
+        </p:nvSpPr>
+        <p:spPr/>
+        <p:txBody>
+          <a:bodyPr/>
+          <a:lstStyle/>
+          <a:p>
+            <a:endParaRPr lang="en-US" dirty="0"/>
+          </a:p>
+        </p:txBody>
+      </p:sp>
+      <p:sp>
+        <p:nvSpPr>
+          <p:cNvPr id="4" name="Slide Number Placeholder 3"/>
+          <p:cNvSpPr>
+            <a:spLocks noGrp="1"/>
+          </p:cNvSpPr>
+          <p:nvPr>
+            <p:ph type="sldNum" sz="quarter" idx="10"/>
+          </p:nvPr>
+        </p:nvSpPr>
+        <p:spPr/>
+        <p:txBody>
+          <a:bodyPr/>
+          <a:lstStyle/>
+          <a:p>
+            <a:fld id="{BA1D5B97-ACF5-4677-A104-92B2393AA446}" type="slidenum">
+              <a:rPr lang="en-US" smtClean="0"/>
+              <a:t>20</a:t>
+            </a:fld>
+            <a:endParaRPr lang="en-US"/>
+          </a:p>
+        </p:txBody>
+      </p:sp>
+    </p:spTree>
+    <p:extLst>
+      <p:ext uri="{BB962C8B-B14F-4D97-AF65-F5344CB8AC3E}">
+        <p14:creationId xmlns:p14="http://schemas.microsoft.com/office/powerpoint/2010/main" val="515334132"/>
+      </p:ext>
+    </p:extLst>
+  </p:cSld>
+  <p:clrMapOvr>
+    <a:masterClrMapping/>
+  </p:clrMapOvr>
+</p:notes>
+</file>
+
 <file path=ppt/notesSlides/notesSlide2.xml><?xml version="1.0" encoding="utf-8"?>
 <p:notes xmlns:a="http://schemas.openxmlformats.org/drawingml/2006/main" xmlns:r="http://schemas.openxmlformats.org/officeDocument/2006/relationships" xmlns:p="http://schemas.openxmlformats.org/presentationml/2006/main">
   <p:cSld>
@@ -621,16 +1357,16 @@
               <a:defRPr/>
             </a:pPr>
             <a:r>
-              <a:rPr lang="en-US" dirty="0" smtClean="0"/>
+              <a:rPr lang="en-US" dirty="0"/>
               <a:t>Program</a:t>
             </a:r>
             <a:r>
-              <a:rPr lang="en-US" baseline="0" dirty="0" smtClean="0"/>
+              <a:rPr lang="en-US" baseline="0" dirty="0"/>
               <a:t> class, main method</a:t>
             </a:r>
           </a:p>
           <a:p>
-            <a:endParaRPr lang="en-US" sz="1200" b="0" i="1" kern="1200" dirty="0" smtClean="0">
+            <a:endParaRPr lang="en-US" sz="1200" b="0" i="1" kern="1200" dirty="0">
               <a:solidFill>
                 <a:schemeClr val="tx1"/>
               </a:solidFill>
@@ -642,7 +1378,7 @@
           </a:p>
           <a:p>
             <a:r>
-              <a:rPr lang="en-US" sz="1200" b="0" i="1" kern="1200" dirty="0" err="1" smtClean="0">
+              <a:rPr lang="en-US" sz="1200" b="0" i="1" kern="1200" dirty="0" err="1">
                 <a:solidFill>
                   <a:schemeClr val="tx1"/>
                 </a:solidFill>
@@ -654,7 +1390,7 @@
               <a:t>Program.cs</a:t>
             </a:r>
             <a:r>
-              <a:rPr lang="en-US" sz="1200" b="0" i="0" kern="1200" dirty="0" smtClean="0">
+              <a:rPr lang="en-US" sz="1200" b="0" i="0" kern="1200" dirty="0">
                 <a:solidFill>
                   <a:schemeClr val="tx1"/>
                 </a:solidFill>
@@ -666,11 +1402,11 @@
               <a:t> code for a non-HTTP workload, with a single </a:t>
             </a:r>
             <a:r>
-              <a:rPr lang="en-US" dirty="0" err="1" smtClean="0"/>
+              <a:rPr lang="en-US" dirty="0" err="1"/>
               <a:t>IHostedService</a:t>
             </a:r>
             <a:r>
-              <a:rPr lang="en-US" sz="1200" b="0" i="0" kern="1200" dirty="0" smtClean="0">
+              <a:rPr lang="en-US" sz="1200" b="0" i="0" kern="1200" dirty="0">
                 <a:solidFill>
                   <a:schemeClr val="tx1"/>
                 </a:solidFill>
@@ -850,7 +1586,7 @@
           <a:lstStyle/>
           <a:p>
             <a:r>
-              <a:rPr lang="en-US" sz="1200" b="0" i="0" kern="1200" dirty="0" smtClean="0">
+              <a:rPr lang="en-US" sz="1200" b="0" i="0" kern="1200" dirty="0">
                 <a:solidFill>
                   <a:schemeClr val="tx1"/>
                 </a:solidFill>
@@ -862,11 +1598,11 @@
               <a:t>If the app uses Entity Framework Core, don't change the name or signature of the </a:t>
             </a:r>
             <a:r>
-              <a:rPr lang="en-US" dirty="0" err="1" smtClean="0"/>
+              <a:rPr lang="en-US" dirty="0" err="1"/>
               <a:t>CreateHostBuilder</a:t>
             </a:r>
             <a:r>
-              <a:rPr lang="en-US" sz="1200" b="0" i="0" kern="1200" dirty="0" smtClean="0">
+              <a:rPr lang="en-US" sz="1200" b="0" i="0" kern="1200" dirty="0">
                 <a:solidFill>
                   <a:schemeClr val="tx1"/>
                 </a:solidFill>
@@ -878,7 +1614,7 @@
               <a:t> method. The </a:t>
             </a:r>
             <a:r>
-              <a:rPr lang="en-US" sz="1200" b="0" i="0" u="sng" kern="1200" dirty="0" smtClean="0">
+              <a:rPr lang="en-US" sz="1200" b="0" i="0" u="sng" kern="1200" dirty="0">
                 <a:solidFill>
                   <a:schemeClr val="tx1"/>
                 </a:solidFill>
@@ -891,7 +1627,7 @@
               <a:t>Entity Framework Core tools</a:t>
             </a:r>
             <a:r>
-              <a:rPr lang="en-US" sz="1200" b="0" i="0" kern="1200" dirty="0" smtClean="0">
+              <a:rPr lang="en-US" sz="1200" b="0" i="0" kern="1200" dirty="0">
                 <a:solidFill>
                   <a:schemeClr val="tx1"/>
                 </a:solidFill>
@@ -903,11 +1639,11 @@
               <a:t> expect to find a </a:t>
             </a:r>
             <a:r>
-              <a:rPr lang="en-US" dirty="0" err="1" smtClean="0"/>
+              <a:rPr lang="en-US" dirty="0" err="1"/>
               <a:t>CreateHostBuilder</a:t>
             </a:r>
             <a:r>
-              <a:rPr lang="en-US" sz="1200" b="0" i="0" kern="1200" dirty="0" smtClean="0">
+              <a:rPr lang="en-US" sz="1200" b="0" i="0" kern="1200" dirty="0">
                 <a:solidFill>
                   <a:schemeClr val="tx1"/>
                 </a:solidFill>
@@ -1087,7 +1823,7 @@
           <a:lstStyle/>
           <a:p>
             <a:r>
-              <a:rPr lang="en-US" sz="1200" b="0" i="0" kern="1200" dirty="0" smtClean="0">
+              <a:rPr lang="en-US" sz="1200" b="0" i="0" kern="1200" dirty="0">
                 <a:solidFill>
                   <a:schemeClr val="tx1"/>
                 </a:solidFill>
@@ -1101,7 +1837,7 @@
           </a:p>
           <a:p>
             <a:r>
-              <a:rPr lang="en-US" sz="1200" b="0" i="0" kern="1200" dirty="0" smtClean="0">
+              <a:rPr lang="en-US" sz="1200" b="0" i="0" kern="1200" dirty="0">
                 <a:solidFill>
                   <a:schemeClr val="tx1"/>
                 </a:solidFill>
@@ -1115,7 +1851,7 @@
           </a:p>
           <a:p>
             <a:r>
-              <a:rPr lang="en-US" sz="1200" b="0" i="0" kern="1200" dirty="0" smtClean="0">
+              <a:rPr lang="en-US" sz="1200" b="0" i="0" kern="1200" dirty="0">
                 <a:solidFill>
                   <a:schemeClr val="tx1"/>
                 </a:solidFill>
@@ -1129,7 +1865,7 @@
           </a:p>
           <a:p>
             <a:r>
-              <a:rPr lang="en-US" sz="1200" b="0" i="0" kern="1200" dirty="0" smtClean="0">
+              <a:rPr lang="en-US" sz="1200" b="0" i="0" kern="1200" dirty="0">
                 <a:solidFill>
                   <a:schemeClr val="tx1"/>
                 </a:solidFill>
@@ -1142,10 +1878,10 @@
             </a:r>
           </a:p>
           <a:p>
-            <a:endParaRPr lang="en-US" dirty="0" smtClean="0"/>
-          </a:p>
-          <a:p>
-            <a:endParaRPr lang="en-US" dirty="0" smtClean="0"/>
+            <a:endParaRPr lang="en-US" dirty="0"/>
+          </a:p>
+          <a:p>
+            <a:endParaRPr lang="en-US" dirty="0"/>
           </a:p>
           <a:p>
             <a:endParaRPr lang="en-US" dirty="0"/>
@@ -1233,7 +1969,7 @@
           <a:lstStyle/>
           <a:p>
             <a:r>
-              <a:rPr lang="en-US" sz="1200" b="1" i="0" kern="1200" dirty="0" smtClean="0">
+              <a:rPr lang="en-US" sz="1200" b="1" i="0" kern="1200" dirty="0">
                 <a:solidFill>
                   <a:schemeClr val="tx1"/>
                 </a:solidFill>
@@ -1247,7 +1983,7 @@
           </a:p>
           <a:p>
             <a:r>
-              <a:rPr lang="en-US" sz="1200" b="0" i="0" kern="1200" dirty="0" smtClean="0">
+              <a:rPr lang="en-US" sz="1200" b="0" i="0" kern="1200" dirty="0">
                 <a:solidFill>
                   <a:schemeClr val="tx1"/>
                 </a:solidFill>
@@ -1260,7 +1996,7 @@
             </a:r>
           </a:p>
           <a:p>
-            <a:endParaRPr lang="en-US" dirty="0" smtClean="0"/>
+            <a:endParaRPr lang="en-US" dirty="0"/>
           </a:p>
           <a:p>
             <a:endParaRPr lang="en-US" dirty="0"/>
@@ -1377,7 +2113,315 @@
     </p:spTree>
     <p:extLst>
       <p:ext uri="{BB962C8B-B14F-4D97-AF65-F5344CB8AC3E}">
-        <p14:creationId xmlns:p14="http://schemas.microsoft.com/office/powerpoint/2010/main" val="515334132"/>
+        <p14:creationId xmlns:p14="http://schemas.microsoft.com/office/powerpoint/2010/main" val="3715739114"/>
+      </p:ext>
+    </p:extLst>
+  </p:cSld>
+  <p:clrMapOvr>
+    <a:masterClrMapping/>
+  </p:clrMapOvr>
+</p:notes>
+</file>
+
+<file path=ppt/notesSlides/notesSlide9.xml><?xml version="1.0" encoding="utf-8"?>
+<p:notes xmlns:a="http://schemas.openxmlformats.org/drawingml/2006/main" xmlns:r="http://schemas.openxmlformats.org/officeDocument/2006/relationships" xmlns:p="http://schemas.openxmlformats.org/presentationml/2006/main">
+  <p:cSld>
+    <p:spTree>
+      <p:nvGrpSpPr>
+        <p:cNvPr id="1" name=""/>
+        <p:cNvGrpSpPr/>
+        <p:nvPr/>
+      </p:nvGrpSpPr>
+      <p:grpSpPr>
+        <a:xfrm>
+          <a:off x="0" y="0"/>
+          <a:ext cx="0" cy="0"/>
+          <a:chOff x="0" y="0"/>
+          <a:chExt cx="0" cy="0"/>
+        </a:xfrm>
+      </p:grpSpPr>
+      <p:sp>
+        <p:nvSpPr>
+          <p:cNvPr id="2" name="Slide Image Placeholder 1"/>
+          <p:cNvSpPr>
+            <a:spLocks noGrp="1" noRot="1" noChangeAspect="1"/>
+          </p:cNvSpPr>
+          <p:nvPr>
+            <p:ph type="sldImg"/>
+          </p:nvPr>
+        </p:nvSpPr>
+        <p:spPr/>
+      </p:sp>
+      <p:sp>
+        <p:nvSpPr>
+          <p:cNvPr id="3" name="Notes Placeholder 2"/>
+          <p:cNvSpPr>
+            <a:spLocks noGrp="1"/>
+          </p:cNvSpPr>
+          <p:nvPr>
+            <p:ph type="body" idx="1"/>
+          </p:nvPr>
+        </p:nvSpPr>
+        <p:spPr/>
+        <p:txBody>
+          <a:bodyPr/>
+          <a:lstStyle/>
+          <a:p>
+            <a:r>
+              <a:rPr lang="en-US" sz="1200" b="0" i="0" kern="1200" dirty="0">
+                <a:solidFill>
+                  <a:schemeClr val="tx1"/>
+                </a:solidFill>
+                <a:effectLst/>
+                <a:latin typeface="+mn-lt"/>
+                <a:ea typeface="+mn-ea"/>
+                <a:cs typeface="+mn-cs"/>
+              </a:rPr>
+              <a:t>handle post-startup and graceful shutdown tasks</a:t>
+            </a:r>
+          </a:p>
+          <a:p>
+            <a:endParaRPr lang="en-US" sz="1200" b="0" i="0" kern="1200" dirty="0">
+              <a:solidFill>
+                <a:schemeClr val="tx1"/>
+              </a:solidFill>
+              <a:effectLst/>
+              <a:latin typeface="+mn-lt"/>
+              <a:ea typeface="+mn-ea"/>
+              <a:cs typeface="+mn-cs"/>
+            </a:endParaRPr>
+          </a:p>
+          <a:p>
+            <a:r>
+              <a:rPr lang="en-US" sz="1200" b="0" i="0" kern="1200" dirty="0" err="1">
+                <a:solidFill>
+                  <a:schemeClr val="tx1"/>
+                </a:solidFill>
+                <a:effectLst/>
+                <a:latin typeface="+mn-lt"/>
+                <a:ea typeface="+mn-ea"/>
+                <a:cs typeface="+mn-cs"/>
+              </a:rPr>
+              <a:t>ApplicationStarted</a:t>
+            </a:r>
+            <a:r>
+              <a:rPr lang="en-US" sz="1200" b="0" i="0" kern="1200" dirty="0">
+                <a:solidFill>
+                  <a:schemeClr val="tx1"/>
+                </a:solidFill>
+                <a:effectLst/>
+                <a:latin typeface="+mn-lt"/>
+                <a:ea typeface="+mn-ea"/>
+                <a:cs typeface="+mn-cs"/>
+              </a:rPr>
+              <a:t>	</a:t>
+            </a:r>
+          </a:p>
+          <a:p>
+            <a:r>
+              <a:rPr lang="en-US" sz="1200" b="0" i="0" kern="1200" dirty="0">
+                <a:solidFill>
+                  <a:schemeClr val="tx1"/>
+                </a:solidFill>
+                <a:effectLst/>
+                <a:latin typeface="+mn-lt"/>
+                <a:ea typeface="+mn-ea"/>
+                <a:cs typeface="+mn-cs"/>
+              </a:rPr>
+              <a:t>Triggered when the application host has fully started.</a:t>
+            </a:r>
+          </a:p>
+          <a:p>
+            <a:endParaRPr lang="en-US" sz="1200" b="0" i="0" kern="1200" dirty="0">
+              <a:solidFill>
+                <a:schemeClr val="tx1"/>
+              </a:solidFill>
+              <a:effectLst/>
+              <a:latin typeface="+mn-lt"/>
+              <a:ea typeface="+mn-ea"/>
+              <a:cs typeface="+mn-cs"/>
+            </a:endParaRPr>
+          </a:p>
+          <a:p>
+            <a:r>
+              <a:rPr lang="en-US" sz="1200" b="0" i="0" kern="1200" dirty="0" err="1">
+                <a:solidFill>
+                  <a:schemeClr val="tx1"/>
+                </a:solidFill>
+                <a:effectLst/>
+                <a:latin typeface="+mn-lt"/>
+                <a:ea typeface="+mn-ea"/>
+                <a:cs typeface="+mn-cs"/>
+              </a:rPr>
+              <a:t>ApplicationStopped</a:t>
+            </a:r>
+            <a:r>
+              <a:rPr lang="en-US" sz="1200" b="0" i="0" kern="1200" dirty="0">
+                <a:solidFill>
+                  <a:schemeClr val="tx1"/>
+                </a:solidFill>
+                <a:effectLst/>
+                <a:latin typeface="+mn-lt"/>
+                <a:ea typeface="+mn-ea"/>
+                <a:cs typeface="+mn-cs"/>
+              </a:rPr>
+              <a:t>	</a:t>
+            </a:r>
+          </a:p>
+          <a:p>
+            <a:r>
+              <a:rPr lang="en-US" sz="1200" b="0" i="0" kern="1200" dirty="0">
+                <a:solidFill>
+                  <a:schemeClr val="tx1"/>
+                </a:solidFill>
+                <a:effectLst/>
+                <a:latin typeface="+mn-lt"/>
+                <a:ea typeface="+mn-ea"/>
+                <a:cs typeface="+mn-cs"/>
+              </a:rPr>
+              <a:t>Triggered when the application host is performing a graceful shutdown. Shutdown will block until this event completes.</a:t>
+            </a:r>
+          </a:p>
+          <a:p>
+            <a:endParaRPr lang="en-US" sz="1200" b="0" i="0" kern="1200" dirty="0">
+              <a:solidFill>
+                <a:schemeClr val="tx1"/>
+              </a:solidFill>
+              <a:effectLst/>
+              <a:latin typeface="+mn-lt"/>
+              <a:ea typeface="+mn-ea"/>
+              <a:cs typeface="+mn-cs"/>
+            </a:endParaRPr>
+          </a:p>
+          <a:p>
+            <a:r>
+              <a:rPr lang="en-US" sz="1200" b="0" i="0" kern="1200" dirty="0" err="1">
+                <a:solidFill>
+                  <a:schemeClr val="tx1"/>
+                </a:solidFill>
+                <a:effectLst/>
+                <a:latin typeface="+mn-lt"/>
+                <a:ea typeface="+mn-ea"/>
+                <a:cs typeface="+mn-cs"/>
+              </a:rPr>
+              <a:t>ApplicationStopping</a:t>
+            </a:r>
+            <a:r>
+              <a:rPr lang="en-US" sz="1200" b="0" i="0" kern="1200" dirty="0">
+                <a:solidFill>
+                  <a:schemeClr val="tx1"/>
+                </a:solidFill>
+                <a:effectLst/>
+                <a:latin typeface="+mn-lt"/>
+                <a:ea typeface="+mn-ea"/>
+                <a:cs typeface="+mn-cs"/>
+              </a:rPr>
+              <a:t>	</a:t>
+            </a:r>
+          </a:p>
+          <a:p>
+            <a:r>
+              <a:rPr lang="en-US" sz="1200" b="0" i="0" kern="1200" dirty="0">
+                <a:solidFill>
+                  <a:schemeClr val="tx1"/>
+                </a:solidFill>
+                <a:effectLst/>
+                <a:latin typeface="+mn-lt"/>
+                <a:ea typeface="+mn-ea"/>
+                <a:cs typeface="+mn-cs"/>
+              </a:rPr>
+              <a:t>Triggered when the application host is performing a graceful shutdown. Shutdown will block until this event completes.</a:t>
+            </a:r>
+          </a:p>
+          <a:p>
+            <a:endParaRPr lang="en-US" sz="1200" b="0" i="0" kern="1200" dirty="0">
+              <a:solidFill>
+                <a:schemeClr val="tx1"/>
+              </a:solidFill>
+              <a:effectLst/>
+              <a:latin typeface="+mn-lt"/>
+              <a:ea typeface="+mn-ea"/>
+              <a:cs typeface="+mn-cs"/>
+            </a:endParaRPr>
+          </a:p>
+          <a:p>
+            <a:r>
+              <a:rPr lang="en-US" sz="1200" b="0" i="0" kern="1200" dirty="0" err="1">
+                <a:solidFill>
+                  <a:schemeClr val="tx1"/>
+                </a:solidFill>
+                <a:effectLst/>
+                <a:latin typeface="+mn-lt"/>
+                <a:ea typeface="+mn-ea"/>
+                <a:cs typeface="+mn-cs"/>
+              </a:rPr>
+              <a:t>StopApplication</a:t>
+            </a:r>
+            <a:r>
+              <a:rPr lang="en-US" sz="1200" b="0" i="0" kern="1200" dirty="0">
+                <a:solidFill>
+                  <a:schemeClr val="tx1"/>
+                </a:solidFill>
+                <a:effectLst/>
+                <a:latin typeface="+mn-lt"/>
+                <a:ea typeface="+mn-ea"/>
+                <a:cs typeface="+mn-cs"/>
+              </a:rPr>
+              <a:t>()	</a:t>
+            </a:r>
+          </a:p>
+          <a:p>
+            <a:r>
+              <a:rPr lang="en-US" sz="1200" b="0" i="0" kern="1200" dirty="0">
+                <a:solidFill>
+                  <a:schemeClr val="tx1"/>
+                </a:solidFill>
+                <a:effectLst/>
+                <a:latin typeface="+mn-lt"/>
+                <a:ea typeface="+mn-ea"/>
+                <a:cs typeface="+mn-cs"/>
+              </a:rPr>
+              <a:t>Requests termination of the current application.</a:t>
+            </a:r>
+            <a:endParaRPr lang="ru-RU" sz="1200" b="0" i="0" kern="1200" dirty="0">
+              <a:solidFill>
+                <a:schemeClr val="tx1"/>
+              </a:solidFill>
+              <a:effectLst/>
+              <a:latin typeface="+mn-lt"/>
+              <a:ea typeface="+mn-ea"/>
+              <a:cs typeface="+mn-cs"/>
+            </a:endParaRPr>
+          </a:p>
+        </p:txBody>
+      </p:sp>
+      <p:sp>
+        <p:nvSpPr>
+          <p:cNvPr id="4" name="Slide Number Placeholder 3"/>
+          <p:cNvSpPr>
+            <a:spLocks noGrp="1"/>
+          </p:cNvSpPr>
+          <p:nvPr>
+            <p:ph type="sldNum" sz="quarter" idx="10"/>
+          </p:nvPr>
+        </p:nvSpPr>
+        <p:spPr/>
+        <p:txBody>
+          <a:bodyPr/>
+          <a:lstStyle/>
+          <a:p>
+            <a:fld id="{BA1D5B97-ACF5-4677-A104-92B2393AA446}" type="slidenum">
+              <a:rPr lang="en-US" smtClean="0"/>
+              <a:t>12</a:t>
+            </a:fld>
+            <a:endParaRPr lang="en-US"/>
+          </a:p>
+        </p:txBody>
+      </p:sp>
+    </p:spTree>
+    <p:extLst>
+      <p:ext uri="{BB962C8B-B14F-4D97-AF65-F5344CB8AC3E}">
+        <p14:creationId xmlns:p14="http://schemas.microsoft.com/office/powerpoint/2010/main" val="270918966"/>
       </p:ext>
     </p:extLst>
   </p:cSld>
@@ -1429,10 +2473,9 @@
           </a:lstStyle>
           <a:p>
             <a:r>
-              <a:rPr lang="en-US" smtClean="0"/>
+              <a:rPr lang="en-US"/>
               <a:t>Click to edit Master title style</a:t>
             </a:r>
-            <a:endParaRPr lang="en-US"/>
           </a:p>
         </p:txBody>
       </p:sp>
@@ -1494,10 +2537,9 @@
           </a:lstStyle>
           <a:p>
             <a:r>
-              <a:rPr lang="en-US" smtClean="0"/>
+              <a:rPr lang="en-US"/>
               <a:t>Click to edit Master subtitle style</a:t>
             </a:r>
-            <a:endParaRPr lang="en-US"/>
           </a:p>
         </p:txBody>
       </p:sp>
@@ -1518,7 +2560,7 @@
           <a:p>
             <a:fld id="{622E22BE-79DE-4FFF-A515-BF1CA8DF801A}" type="datetimeFigureOut">
               <a:rPr lang="en-US" smtClean="0"/>
-              <a:t>25-Nov-19</a:t>
+              <a:t>11/26/2019</a:t>
             </a:fld>
             <a:endParaRPr lang="en-US"/>
           </a:p>
@@ -1612,10 +2654,9 @@
           <a:lstStyle/>
           <a:p>
             <a:r>
-              <a:rPr lang="en-US" smtClean="0"/>
+              <a:rPr lang="en-US"/>
               <a:t>Click to edit Master title style</a:t>
             </a:r>
-            <a:endParaRPr lang="en-US"/>
           </a:p>
         </p:txBody>
       </p:sp>
@@ -1636,38 +2677,37 @@
           <a:p>
             <a:pPr lvl="0"/>
             <a:r>
-              <a:rPr lang="en-US" smtClean="0"/>
+              <a:rPr lang="en-US"/>
               <a:t>Edit Master text styles</a:t>
             </a:r>
           </a:p>
           <a:p>
             <a:pPr lvl="1"/>
             <a:r>
-              <a:rPr lang="en-US" smtClean="0"/>
+              <a:rPr lang="en-US"/>
               <a:t>Second level</a:t>
             </a:r>
           </a:p>
           <a:p>
             <a:pPr lvl="2"/>
             <a:r>
-              <a:rPr lang="en-US" smtClean="0"/>
+              <a:rPr lang="en-US"/>
               <a:t>Third level</a:t>
             </a:r>
           </a:p>
           <a:p>
             <a:pPr lvl="3"/>
             <a:r>
-              <a:rPr lang="en-US" smtClean="0"/>
+              <a:rPr lang="en-US"/>
               <a:t>Fourth level</a:t>
             </a:r>
           </a:p>
           <a:p>
             <a:pPr lvl="4"/>
             <a:r>
-              <a:rPr lang="en-US" smtClean="0"/>
+              <a:rPr lang="en-US"/>
               <a:t>Fifth level</a:t>
             </a:r>
-            <a:endParaRPr lang="en-US"/>
           </a:p>
         </p:txBody>
       </p:sp>
@@ -1688,7 +2728,7 @@
           <a:p>
             <a:fld id="{622E22BE-79DE-4FFF-A515-BF1CA8DF801A}" type="datetimeFigureOut">
               <a:rPr lang="en-US" smtClean="0"/>
-              <a:t>25-Nov-19</a:t>
+              <a:t>11/26/2019</a:t>
             </a:fld>
             <a:endParaRPr lang="en-US"/>
           </a:p>
@@ -1787,10 +2827,9 @@
           <a:lstStyle/>
           <a:p>
             <a:r>
-              <a:rPr lang="en-US" smtClean="0"/>
+              <a:rPr lang="en-US"/>
               <a:t>Click to edit Master title style</a:t>
             </a:r>
-            <a:endParaRPr lang="en-US"/>
           </a:p>
         </p:txBody>
       </p:sp>
@@ -1816,38 +2855,37 @@
           <a:p>
             <a:pPr lvl="0"/>
             <a:r>
-              <a:rPr lang="en-US" smtClean="0"/>
+              <a:rPr lang="en-US"/>
               <a:t>Edit Master text styles</a:t>
             </a:r>
           </a:p>
           <a:p>
             <a:pPr lvl="1"/>
             <a:r>
-              <a:rPr lang="en-US" smtClean="0"/>
+              <a:rPr lang="en-US"/>
               <a:t>Second level</a:t>
             </a:r>
           </a:p>
           <a:p>
             <a:pPr lvl="2"/>
             <a:r>
-              <a:rPr lang="en-US" smtClean="0"/>
+              <a:rPr lang="en-US"/>
               <a:t>Third level</a:t>
             </a:r>
           </a:p>
           <a:p>
             <a:pPr lvl="3"/>
             <a:r>
-              <a:rPr lang="en-US" smtClean="0"/>
+              <a:rPr lang="en-US"/>
               <a:t>Fourth level</a:t>
             </a:r>
           </a:p>
           <a:p>
             <a:pPr lvl="4"/>
             <a:r>
-              <a:rPr lang="en-US" smtClean="0"/>
+              <a:rPr lang="en-US"/>
               <a:t>Fifth level</a:t>
             </a:r>
-            <a:endParaRPr lang="en-US"/>
           </a:p>
         </p:txBody>
       </p:sp>
@@ -1868,7 +2906,7 @@
           <a:p>
             <a:fld id="{622E22BE-79DE-4FFF-A515-BF1CA8DF801A}" type="datetimeFigureOut">
               <a:rPr lang="en-US" smtClean="0"/>
-              <a:t>25-Nov-19</a:t>
+              <a:t>11/26/2019</a:t>
             </a:fld>
             <a:endParaRPr lang="en-US"/>
           </a:p>
@@ -1962,10 +3000,9 @@
           <a:lstStyle/>
           <a:p>
             <a:r>
-              <a:rPr lang="en-US" smtClean="0"/>
+              <a:rPr lang="en-US"/>
               <a:t>Click to edit Master title style</a:t>
             </a:r>
-            <a:endParaRPr lang="en-US"/>
           </a:p>
         </p:txBody>
       </p:sp>
@@ -1986,38 +3023,37 @@
           <a:p>
             <a:pPr lvl="0"/>
             <a:r>
-              <a:rPr lang="en-US" smtClean="0"/>
+              <a:rPr lang="en-US"/>
               <a:t>Edit Master text styles</a:t>
             </a:r>
           </a:p>
           <a:p>
             <a:pPr lvl="1"/>
             <a:r>
-              <a:rPr lang="en-US" smtClean="0"/>
+              <a:rPr lang="en-US"/>
               <a:t>Second level</a:t>
             </a:r>
           </a:p>
           <a:p>
             <a:pPr lvl="2"/>
             <a:r>
-              <a:rPr lang="en-US" smtClean="0"/>
+              <a:rPr lang="en-US"/>
               <a:t>Third level</a:t>
             </a:r>
           </a:p>
           <a:p>
             <a:pPr lvl="3"/>
             <a:r>
-              <a:rPr lang="en-US" smtClean="0"/>
+              <a:rPr lang="en-US"/>
               <a:t>Fourth level</a:t>
             </a:r>
           </a:p>
           <a:p>
             <a:pPr lvl="4"/>
             <a:r>
-              <a:rPr lang="en-US" smtClean="0"/>
+              <a:rPr lang="en-US"/>
               <a:t>Fifth level</a:t>
             </a:r>
-            <a:endParaRPr lang="en-US"/>
           </a:p>
         </p:txBody>
       </p:sp>
@@ -2038,7 +3074,7 @@
           <a:p>
             <a:fld id="{622E22BE-79DE-4FFF-A515-BF1CA8DF801A}" type="datetimeFigureOut">
               <a:rPr lang="en-US" smtClean="0"/>
-              <a:t>25-Nov-19</a:t>
+              <a:t>11/26/2019</a:t>
             </a:fld>
             <a:endParaRPr lang="en-US"/>
           </a:p>
@@ -2141,10 +3177,9 @@
           </a:lstStyle>
           <a:p>
             <a:r>
-              <a:rPr lang="en-US" smtClean="0"/>
+              <a:rPr lang="en-US"/>
               <a:t>Click to edit Master title style</a:t>
             </a:r>
-            <a:endParaRPr lang="en-US"/>
           </a:p>
         </p:txBody>
       </p:sp>
@@ -2261,7 +3296,7 @@
           <a:p>
             <a:pPr lvl="0"/>
             <a:r>
-              <a:rPr lang="en-US" smtClean="0"/>
+              <a:rPr lang="en-US"/>
               <a:t>Edit Master text styles</a:t>
             </a:r>
           </a:p>
@@ -2284,7 +3319,7 @@
           <a:p>
             <a:fld id="{622E22BE-79DE-4FFF-A515-BF1CA8DF801A}" type="datetimeFigureOut">
               <a:rPr lang="en-US" smtClean="0"/>
-              <a:t>25-Nov-19</a:t>
+              <a:t>11/26/2019</a:t>
             </a:fld>
             <a:endParaRPr lang="en-US"/>
           </a:p>
@@ -2378,10 +3413,9 @@
           <a:lstStyle/>
           <a:p>
             <a:r>
-              <a:rPr lang="en-US" smtClean="0"/>
+              <a:rPr lang="en-US"/>
               <a:t>Click to edit Master title style</a:t>
             </a:r>
-            <a:endParaRPr lang="en-US"/>
           </a:p>
         </p:txBody>
       </p:sp>
@@ -2407,38 +3441,37 @@
           <a:p>
             <a:pPr lvl="0"/>
             <a:r>
-              <a:rPr lang="en-US" smtClean="0"/>
+              <a:rPr lang="en-US"/>
               <a:t>Edit Master text styles</a:t>
             </a:r>
           </a:p>
           <a:p>
             <a:pPr lvl="1"/>
             <a:r>
-              <a:rPr lang="en-US" smtClean="0"/>
+              <a:rPr lang="en-US"/>
               <a:t>Second level</a:t>
             </a:r>
           </a:p>
           <a:p>
             <a:pPr lvl="2"/>
             <a:r>
-              <a:rPr lang="en-US" smtClean="0"/>
+              <a:rPr lang="en-US"/>
               <a:t>Third level</a:t>
             </a:r>
           </a:p>
           <a:p>
             <a:pPr lvl="3"/>
             <a:r>
-              <a:rPr lang="en-US" smtClean="0"/>
+              <a:rPr lang="en-US"/>
               <a:t>Fourth level</a:t>
             </a:r>
           </a:p>
           <a:p>
             <a:pPr lvl="4"/>
             <a:r>
-              <a:rPr lang="en-US" smtClean="0"/>
+              <a:rPr lang="en-US"/>
               <a:t>Fifth level</a:t>
             </a:r>
-            <a:endParaRPr lang="en-US"/>
           </a:p>
         </p:txBody>
       </p:sp>
@@ -2464,38 +3497,37 @@
           <a:p>
             <a:pPr lvl="0"/>
             <a:r>
-              <a:rPr lang="en-US" smtClean="0"/>
+              <a:rPr lang="en-US"/>
               <a:t>Edit Master text styles</a:t>
             </a:r>
           </a:p>
           <a:p>
             <a:pPr lvl="1"/>
             <a:r>
-              <a:rPr lang="en-US" smtClean="0"/>
+              <a:rPr lang="en-US"/>
               <a:t>Second level</a:t>
             </a:r>
           </a:p>
           <a:p>
             <a:pPr lvl="2"/>
             <a:r>
-              <a:rPr lang="en-US" smtClean="0"/>
+              <a:rPr lang="en-US"/>
               <a:t>Third level</a:t>
             </a:r>
           </a:p>
           <a:p>
             <a:pPr lvl="3"/>
             <a:r>
-              <a:rPr lang="en-US" smtClean="0"/>
+              <a:rPr lang="en-US"/>
               <a:t>Fourth level</a:t>
             </a:r>
           </a:p>
           <a:p>
             <a:pPr lvl="4"/>
             <a:r>
-              <a:rPr lang="en-US" smtClean="0"/>
+              <a:rPr lang="en-US"/>
               <a:t>Fifth level</a:t>
             </a:r>
-            <a:endParaRPr lang="en-US"/>
           </a:p>
         </p:txBody>
       </p:sp>
@@ -2516,7 +3548,7 @@
           <a:p>
             <a:fld id="{622E22BE-79DE-4FFF-A515-BF1CA8DF801A}" type="datetimeFigureOut">
               <a:rPr lang="en-US" smtClean="0"/>
-              <a:t>25-Nov-19</a:t>
+              <a:t>11/26/2019</a:t>
             </a:fld>
             <a:endParaRPr lang="en-US"/>
           </a:p>
@@ -2615,10 +3647,9 @@
           <a:lstStyle/>
           <a:p>
             <a:r>
-              <a:rPr lang="en-US" smtClean="0"/>
+              <a:rPr lang="en-US"/>
               <a:t>Click to edit Master title style</a:t>
             </a:r>
-            <a:endParaRPr lang="en-US"/>
           </a:p>
         </p:txBody>
       </p:sp>
@@ -2681,7 +3712,7 @@
           <a:p>
             <a:pPr lvl="0"/>
             <a:r>
-              <a:rPr lang="en-US" smtClean="0"/>
+              <a:rPr lang="en-US"/>
               <a:t>Edit Master text styles</a:t>
             </a:r>
           </a:p>
@@ -2709,38 +3740,37 @@
           <a:p>
             <a:pPr lvl="0"/>
             <a:r>
-              <a:rPr lang="en-US" smtClean="0"/>
+              <a:rPr lang="en-US"/>
               <a:t>Edit Master text styles</a:t>
             </a:r>
           </a:p>
           <a:p>
             <a:pPr lvl="1"/>
             <a:r>
-              <a:rPr lang="en-US" smtClean="0"/>
+              <a:rPr lang="en-US"/>
               <a:t>Second level</a:t>
             </a:r>
           </a:p>
           <a:p>
             <a:pPr lvl="2"/>
             <a:r>
-              <a:rPr lang="en-US" smtClean="0"/>
+              <a:rPr lang="en-US"/>
               <a:t>Third level</a:t>
             </a:r>
           </a:p>
           <a:p>
             <a:pPr lvl="3"/>
             <a:r>
-              <a:rPr lang="en-US" smtClean="0"/>
+              <a:rPr lang="en-US"/>
               <a:t>Fourth level</a:t>
             </a:r>
           </a:p>
           <a:p>
             <a:pPr lvl="4"/>
             <a:r>
-              <a:rPr lang="en-US" smtClean="0"/>
+              <a:rPr lang="en-US"/>
               <a:t>Fifth level</a:t>
             </a:r>
-            <a:endParaRPr lang="en-US"/>
           </a:p>
         </p:txBody>
       </p:sp>
@@ -2803,7 +3833,7 @@
           <a:p>
             <a:pPr lvl="0"/>
             <a:r>
-              <a:rPr lang="en-US" smtClean="0"/>
+              <a:rPr lang="en-US"/>
               <a:t>Edit Master text styles</a:t>
             </a:r>
           </a:p>
@@ -2831,38 +3861,37 @@
           <a:p>
             <a:pPr lvl="0"/>
             <a:r>
-              <a:rPr lang="en-US" smtClean="0"/>
+              <a:rPr lang="en-US"/>
               <a:t>Edit Master text styles</a:t>
             </a:r>
           </a:p>
           <a:p>
             <a:pPr lvl="1"/>
             <a:r>
-              <a:rPr lang="en-US" smtClean="0"/>
+              <a:rPr lang="en-US"/>
               <a:t>Second level</a:t>
             </a:r>
           </a:p>
           <a:p>
             <a:pPr lvl="2"/>
             <a:r>
-              <a:rPr lang="en-US" smtClean="0"/>
+              <a:rPr lang="en-US"/>
               <a:t>Third level</a:t>
             </a:r>
           </a:p>
           <a:p>
             <a:pPr lvl="3"/>
             <a:r>
-              <a:rPr lang="en-US" smtClean="0"/>
+              <a:rPr lang="en-US"/>
               <a:t>Fourth level</a:t>
             </a:r>
           </a:p>
           <a:p>
             <a:pPr lvl="4"/>
             <a:r>
-              <a:rPr lang="en-US" smtClean="0"/>
+              <a:rPr lang="en-US"/>
               <a:t>Fifth level</a:t>
             </a:r>
-            <a:endParaRPr lang="en-US"/>
           </a:p>
         </p:txBody>
       </p:sp>
@@ -2883,7 +3912,7 @@
           <a:p>
             <a:fld id="{622E22BE-79DE-4FFF-A515-BF1CA8DF801A}" type="datetimeFigureOut">
               <a:rPr lang="en-US" smtClean="0"/>
-              <a:t>25-Nov-19</a:t>
+              <a:t>11/26/2019</a:t>
             </a:fld>
             <a:endParaRPr lang="en-US"/>
           </a:p>
@@ -2977,10 +4006,9 @@
           <a:lstStyle/>
           <a:p>
             <a:r>
-              <a:rPr lang="en-US" smtClean="0"/>
+              <a:rPr lang="en-US"/>
               <a:t>Click to edit Master title style</a:t>
             </a:r>
-            <a:endParaRPr lang="en-US"/>
           </a:p>
         </p:txBody>
       </p:sp>
@@ -3001,7 +4029,7 @@
           <a:p>
             <a:fld id="{622E22BE-79DE-4FFF-A515-BF1CA8DF801A}" type="datetimeFigureOut">
               <a:rPr lang="en-US" smtClean="0"/>
-              <a:t>25-Nov-19</a:t>
+              <a:t>11/26/2019</a:t>
             </a:fld>
             <a:endParaRPr lang="en-US"/>
           </a:p>
@@ -3096,7 +4124,7 @@
           <a:p>
             <a:fld id="{622E22BE-79DE-4FFF-A515-BF1CA8DF801A}" type="datetimeFigureOut">
               <a:rPr lang="en-US" smtClean="0"/>
-              <a:t>25-Nov-19</a:t>
+              <a:t>11/26/2019</a:t>
             </a:fld>
             <a:endParaRPr lang="en-US"/>
           </a:p>
@@ -3199,10 +4227,9 @@
           </a:lstStyle>
           <a:p>
             <a:r>
-              <a:rPr lang="en-US" smtClean="0"/>
+              <a:rPr lang="en-US"/>
               <a:t>Click to edit Master title style</a:t>
             </a:r>
-            <a:endParaRPr lang="en-US"/>
           </a:p>
         </p:txBody>
       </p:sp>
@@ -3256,38 +4283,37 @@
           <a:p>
             <a:pPr lvl="0"/>
             <a:r>
-              <a:rPr lang="en-US" smtClean="0"/>
+              <a:rPr lang="en-US"/>
               <a:t>Edit Master text styles</a:t>
             </a:r>
           </a:p>
           <a:p>
             <a:pPr lvl="1"/>
             <a:r>
-              <a:rPr lang="en-US" smtClean="0"/>
+              <a:rPr lang="en-US"/>
               <a:t>Second level</a:t>
             </a:r>
           </a:p>
           <a:p>
             <a:pPr lvl="2"/>
             <a:r>
-              <a:rPr lang="en-US" smtClean="0"/>
+              <a:rPr lang="en-US"/>
               <a:t>Third level</a:t>
             </a:r>
           </a:p>
           <a:p>
             <a:pPr lvl="3"/>
             <a:r>
-              <a:rPr lang="en-US" smtClean="0"/>
+              <a:rPr lang="en-US"/>
               <a:t>Fourth level</a:t>
             </a:r>
           </a:p>
           <a:p>
             <a:pPr lvl="4"/>
             <a:r>
-              <a:rPr lang="en-US" smtClean="0"/>
+              <a:rPr lang="en-US"/>
               <a:t>Fifth level</a:t>
             </a:r>
-            <a:endParaRPr lang="en-US"/>
           </a:p>
         </p:txBody>
       </p:sp>
@@ -3350,7 +4376,7 @@
           <a:p>
             <a:pPr lvl="0"/>
             <a:r>
-              <a:rPr lang="en-US" smtClean="0"/>
+              <a:rPr lang="en-US"/>
               <a:t>Edit Master text styles</a:t>
             </a:r>
           </a:p>
@@ -3373,7 +4399,7 @@
           <a:p>
             <a:fld id="{622E22BE-79DE-4FFF-A515-BF1CA8DF801A}" type="datetimeFigureOut">
               <a:rPr lang="en-US" smtClean="0"/>
-              <a:t>25-Nov-19</a:t>
+              <a:t>11/26/2019</a:t>
             </a:fld>
             <a:endParaRPr lang="en-US"/>
           </a:p>
@@ -3476,10 +4502,9 @@
           </a:lstStyle>
           <a:p>
             <a:r>
-              <a:rPr lang="en-US" smtClean="0"/>
+              <a:rPr lang="en-US"/>
               <a:t>Click to edit Master title style</a:t>
             </a:r>
-            <a:endParaRPr lang="en-US"/>
           </a:p>
         </p:txBody>
       </p:sp>
@@ -3603,7 +4628,7 @@
           <a:p>
             <a:pPr lvl="0"/>
             <a:r>
-              <a:rPr lang="en-US" smtClean="0"/>
+              <a:rPr lang="en-US"/>
               <a:t>Edit Master text styles</a:t>
             </a:r>
           </a:p>
@@ -3626,7 +4651,7 @@
           <a:p>
             <a:fld id="{622E22BE-79DE-4FFF-A515-BF1CA8DF801A}" type="datetimeFigureOut">
               <a:rPr lang="en-US" smtClean="0"/>
-              <a:t>25-Nov-19</a:t>
+              <a:t>11/26/2019</a:t>
             </a:fld>
             <a:endParaRPr lang="en-US"/>
           </a:p>
@@ -3735,10 +4760,9 @@
           <a:lstStyle/>
           <a:p>
             <a:r>
-              <a:rPr lang="en-US" smtClean="0"/>
+              <a:rPr lang="en-US"/>
               <a:t>Click to edit Master title style</a:t>
             </a:r>
-            <a:endParaRPr lang="en-US"/>
           </a:p>
         </p:txBody>
       </p:sp>
@@ -3769,38 +4793,37 @@
           <a:p>
             <a:pPr lvl="0"/>
             <a:r>
-              <a:rPr lang="en-US" smtClean="0"/>
+              <a:rPr lang="en-US"/>
               <a:t>Edit Master text styles</a:t>
             </a:r>
           </a:p>
           <a:p>
             <a:pPr lvl="1"/>
             <a:r>
-              <a:rPr lang="en-US" smtClean="0"/>
+              <a:rPr lang="en-US"/>
               <a:t>Second level</a:t>
             </a:r>
           </a:p>
           <a:p>
             <a:pPr lvl="2"/>
             <a:r>
-              <a:rPr lang="en-US" smtClean="0"/>
+              <a:rPr lang="en-US"/>
               <a:t>Third level</a:t>
             </a:r>
           </a:p>
           <a:p>
             <a:pPr lvl="3"/>
             <a:r>
-              <a:rPr lang="en-US" smtClean="0"/>
+              <a:rPr lang="en-US"/>
               <a:t>Fourth level</a:t>
             </a:r>
           </a:p>
           <a:p>
             <a:pPr lvl="4"/>
             <a:r>
-              <a:rPr lang="en-US" smtClean="0"/>
+              <a:rPr lang="en-US"/>
               <a:t>Fifth level</a:t>
             </a:r>
-            <a:endParaRPr lang="en-US"/>
           </a:p>
         </p:txBody>
       </p:sp>
@@ -3839,7 +4862,7 @@
           <a:p>
             <a:fld id="{622E22BE-79DE-4FFF-A515-BF1CA8DF801A}" type="datetimeFigureOut">
               <a:rPr lang="en-US" smtClean="0"/>
-              <a:t>25-Nov-19</a:t>
+              <a:t>11/26/2019</a:t>
             </a:fld>
             <a:endParaRPr lang="en-US"/>
           </a:p>
@@ -4299,32 +5322,31 @@
           <a:lstStyle/>
           <a:p>
             <a:r>
-              <a:rPr lang="en-US" dirty="0" smtClean="0"/>
+              <a:rPr lang="en-US" dirty="0"/>
               <a:t>Host, Startup, DI</a:t>
             </a:r>
             <a:br>
-              <a:rPr lang="en-US" dirty="0" smtClean="0"/>
+              <a:rPr lang="en-US" dirty="0"/>
             </a:br>
             <a:r>
-              <a:rPr lang="en-US" dirty="0" smtClean="0"/>
+              <a:rPr lang="en-US" dirty="0"/>
               <a:t>in</a:t>
             </a:r>
             <a:br>
-              <a:rPr lang="en-US" dirty="0" smtClean="0"/>
+              <a:rPr lang="en-US" dirty="0"/>
             </a:br>
             <a:r>
-              <a:rPr lang="en-US" dirty="0" smtClean="0"/>
+              <a:rPr lang="en-US" dirty="0"/>
               <a:t>ASP </a:t>
             </a:r>
             <a:r>
-              <a:rPr lang="en-US" dirty="0" err="1" smtClean="0"/>
+              <a:rPr lang="en-US" dirty="0" err="1"/>
               <a:t>.Net</a:t>
             </a:r>
             <a:r>
-              <a:rPr lang="en-US" dirty="0" smtClean="0"/>
+              <a:rPr lang="en-US" dirty="0"/>
               <a:t> Core 3.0</a:t>
             </a:r>
-            <a:endParaRPr lang="en-US" dirty="0"/>
           </a:p>
         </p:txBody>
       </p:sp>
@@ -4349,11 +5371,11 @@
           <a:lstStyle/>
           <a:p>
             <a:r>
-              <a:rPr lang="en-US" dirty="0" smtClean="0"/>
+              <a:rPr lang="en-US" dirty="0"/>
               <a:t>Evgeniy </a:t>
             </a:r>
             <a:r>
-              <a:rPr lang="en-US" dirty="0" err="1" smtClean="0"/>
+              <a:rPr lang="en-US" dirty="0" err="1"/>
               <a:t>Pilyaev</a:t>
             </a:r>
             <a:endParaRPr lang="en-US" dirty="0"/>
@@ -4370,13 +5392,6 @@
   <p:clrMapOvr>
     <a:masterClrMapping/>
   </p:clrMapOvr>
-  <p:timing>
-    <p:tnLst>
-      <p:par>
-        <p:cTn id="1" dur="indefinite" restart="never" nodeType="tmRoot"/>
-      </p:par>
-    </p:tnLst>
-  </p:timing>
 </p:sld>
 </file>
 
@@ -4452,14 +5467,13 @@
           <a:lstStyle/>
           <a:p>
             <a:r>
-              <a:rPr lang="en-US" dirty="0" err="1" smtClean="0"/>
+              <a:rPr lang="en-US" dirty="0" err="1"/>
               <a:t>ConfigureWebHostsDefault</a:t>
             </a:r>
             <a:r>
-              <a:rPr lang="en-US" dirty="0" smtClean="0"/>
+              <a:rPr lang="en-US" dirty="0"/>
               <a:t>:</a:t>
             </a:r>
-            <a:endParaRPr lang="en-US" dirty="0"/>
           </a:p>
         </p:txBody>
       </p:sp>
@@ -4491,11 +5505,7 @@
             </a:pPr>
             <a:r>
               <a:rPr lang="en-US" sz="2400" dirty="0"/>
-              <a:t>Loads host configuration from environment variables prefixed with "ASPNETCORE</a:t>
-            </a:r>
-            <a:r>
-              <a:rPr lang="en-US" sz="2400" dirty="0" smtClean="0"/>
-              <a:t>_".</a:t>
+              <a:t>Loads host configuration from environment variables prefixed with "ASPNETCORE_".</a:t>
             </a:r>
           </a:p>
           <a:p>
@@ -4514,7 +5524,6 @@
               <a:rPr lang="en-US" sz="2400" dirty="0"/>
               <a:t>Sets Kestrel server as the web server and configures it using the app's hosting configuration providers. </a:t>
             </a:r>
-            <a:endParaRPr lang="en-US" sz="2400" dirty="0" smtClean="0"/>
           </a:p>
           <a:p>
             <a:pPr marL="285750" indent="-285750">
@@ -4529,16 +5538,8 @@
               <a:buChar char="•"/>
             </a:pPr>
             <a:r>
-              <a:rPr lang="en-US" sz="2400" dirty="0" smtClean="0"/>
-              <a:t>Adds </a:t>
-            </a:r>
-            <a:r>
               <a:rPr lang="en-US" sz="2400" dirty="0"/>
-              <a:t>Host Filtering middleware</a:t>
-            </a:r>
-            <a:r>
-              <a:rPr lang="en-US" sz="2400" dirty="0" smtClean="0"/>
-              <a:t>.</a:t>
+              <a:t>Adds Host Filtering middleware.</a:t>
             </a:r>
           </a:p>
           <a:p>
@@ -4555,11 +5556,7 @@
             </a:pPr>
             <a:r>
               <a:rPr lang="en-US" sz="2400" dirty="0"/>
-              <a:t>Adds Forwarded Headers middleware if ASPNETCORE_FORWARDEDHEADERS_ENABLED=true</a:t>
-            </a:r>
-            <a:r>
-              <a:rPr lang="en-US" sz="2400" dirty="0" smtClean="0"/>
-              <a:t>.</a:t>
+              <a:t>Adds Forwarded Headers middleware if ASPNETCORE_FORWARDEDHEADERS_ENABLED=true.</a:t>
             </a:r>
           </a:p>
           <a:p>
@@ -4578,7 +5575,6 @@
               <a:rPr lang="en-US" sz="2400" dirty="0"/>
               <a:t>Enables IIS integration.</a:t>
             </a:r>
-            <a:endParaRPr lang="en-US" sz="2400" dirty="0"/>
           </a:p>
         </p:txBody>
       </p:sp>
@@ -4592,13 +5588,6 @@
   <p:clrMapOvr>
     <a:masterClrMapping/>
   </p:clrMapOvr>
-  <p:timing>
-    <p:tnLst>
-      <p:par>
-        <p:cTn id="1" dur="indefinite" restart="never" nodeType="tmRoot"/>
-      </p:par>
-    </p:tnLst>
-  </p:timing>
 </p:sld>
 </file>
 
@@ -4665,120 +5654,122 @@
         </p:nvSpPr>
         <p:spPr>
           <a:xfrm>
-            <a:off x="723130" y="784994"/>
-            <a:ext cx="10515600" cy="4689683"/>
+            <a:off x="181708" y="60325"/>
+            <a:ext cx="10515600" cy="1325563"/>
           </a:xfrm>
         </p:spPr>
         <p:txBody>
-          <a:bodyPr>
-            <a:normAutofit/>
+          <a:bodyPr/>
+          <a:lstStyle/>
+          <a:p>
+            <a:r>
+              <a:rPr lang="en-US" dirty="0"/>
+              <a:t>Framework-provided services</a:t>
+            </a:r>
+          </a:p>
+        </p:txBody>
+      </p:sp>
+      <p:sp>
+        <p:nvSpPr>
+          <p:cNvPr id="4" name="TextBox 3"/>
+          <p:cNvSpPr txBox="1"/>
+          <p:nvPr/>
+        </p:nvSpPr>
+        <p:spPr>
+          <a:xfrm>
+            <a:off x="885092" y="1866530"/>
+            <a:ext cx="11588261" cy="3539430"/>
+          </a:xfrm>
+          <a:prstGeom prst="rect">
+            <a:avLst/>
+          </a:prstGeom>
+          <a:noFill/>
+        </p:spPr>
+        <p:txBody>
+          <a:bodyPr wrap="square" rtlCol="0">
+            <a:spAutoFit/>
           </a:bodyPr>
           <a:lstStyle/>
           <a:p>
-            <a:pPr algn="ctr"/>
-            <a:r>
-              <a:rPr lang="en-US" dirty="0" smtClean="0"/>
-              <a:t>Thanks for attention</a:t>
-            </a:r>
-            <a:br>
-              <a:rPr lang="en-US" dirty="0" smtClean="0"/>
-            </a:br>
-            <a:r>
-              <a:rPr lang="en-US" dirty="0"/>
-              <a:t/>
-            </a:r>
-            <a:br>
-              <a:rPr lang="en-US" dirty="0"/>
-            </a:br>
-            <a:r>
-              <a:rPr lang="en-US" dirty="0" smtClean="0"/>
-              <a:t>Evgeniy </a:t>
-            </a:r>
-            <a:r>
-              <a:rPr lang="en-US" dirty="0" err="1" smtClean="0"/>
-              <a:t>Pilyaev</a:t>
-            </a:r>
-            <a:r>
-              <a:rPr lang="en-US" dirty="0" smtClean="0"/>
-              <a:t/>
-            </a:r>
-            <a:br>
-              <a:rPr lang="en-US" dirty="0" smtClean="0"/>
-            </a:br>
-            <a:r>
-              <a:rPr lang="en-US" dirty="0" smtClean="0"/>
-              <a:t/>
-            </a:r>
-            <a:br>
-              <a:rPr lang="en-US" dirty="0" smtClean="0"/>
-            </a:br>
-            <a:r>
-              <a:rPr lang="en-US" dirty="0">
-                <a:hlinkClick r:id="rId3"/>
-              </a:rPr>
-              <a:t>https://</a:t>
-            </a:r>
-            <a:r>
-              <a:rPr lang="en-US" dirty="0" smtClean="0">
-                <a:hlinkClick r:id="rId3"/>
-              </a:rPr>
-              <a:t>github.com/EPilyaev/ASPNetCoreMVC</a:t>
-            </a:r>
-            <a:r>
-              <a:rPr lang="en-US" dirty="0" smtClean="0"/>
-              <a:t/>
-            </a:r>
-            <a:br>
-              <a:rPr lang="en-US" dirty="0" smtClean="0"/>
-            </a:br>
-            <a:r>
-              <a:rPr lang="en-US" dirty="0" smtClean="0"/>
-              <a:t/>
-            </a:r>
-            <a:br>
-              <a:rPr lang="en-US" dirty="0" smtClean="0"/>
-            </a:br>
-            <a:r>
-              <a:rPr lang="en-US" dirty="0"/>
-              <a:t>(</a:t>
-            </a:r>
-            <a:r>
-              <a:rPr lang="en-US" dirty="0" err="1"/>
-              <a:t>Host&amp;Startup&amp;Di</a:t>
-            </a:r>
-            <a:r>
-              <a:rPr lang="en-US" dirty="0"/>
-              <a:t> </a:t>
-            </a:r>
-            <a:r>
-              <a:rPr lang="en-US" dirty="0" smtClean="0"/>
-              <a:t>presentation)</a:t>
-            </a:r>
-            <a:endParaRPr lang="en-US" dirty="0"/>
+            <a:r>
+              <a:rPr lang="en-US" sz="3200" dirty="0"/>
+              <a:t>Services that are registered automatically include the following:</a:t>
+            </a:r>
+          </a:p>
+          <a:p>
+            <a:endParaRPr lang="en-US" sz="3200" dirty="0"/>
+          </a:p>
+          <a:p>
+            <a:pPr marL="285750" indent="-285750">
+              <a:buFont typeface="Arial" panose="020B0604020202020204" pitchFamily="34" charset="0"/>
+              <a:buChar char="•"/>
+            </a:pPr>
+            <a:r>
+              <a:rPr lang="en-US" sz="3200" dirty="0" err="1"/>
+              <a:t>IHostApplicationLifetime</a:t>
+            </a:r>
+            <a:endParaRPr lang="en-US" sz="3200" dirty="0"/>
+          </a:p>
+          <a:p>
+            <a:pPr marL="285750" indent="-285750">
+              <a:buFont typeface="Arial" panose="020B0604020202020204" pitchFamily="34" charset="0"/>
+              <a:buChar char="•"/>
+            </a:pPr>
+            <a:endParaRPr lang="en-US" sz="3200" dirty="0"/>
+          </a:p>
+          <a:p>
+            <a:pPr marL="285750" indent="-285750">
+              <a:buFont typeface="Arial" panose="020B0604020202020204" pitchFamily="34" charset="0"/>
+              <a:buChar char="•"/>
+            </a:pPr>
+            <a:r>
+              <a:rPr lang="en-US" sz="3200" dirty="0" err="1"/>
+              <a:t>IHostLifetime</a:t>
+            </a:r>
+            <a:endParaRPr lang="en-US" sz="3200" dirty="0"/>
+          </a:p>
+          <a:p>
+            <a:pPr marL="285750" indent="-285750">
+              <a:buFont typeface="Arial" panose="020B0604020202020204" pitchFamily="34" charset="0"/>
+              <a:buChar char="•"/>
+            </a:pPr>
+            <a:endParaRPr lang="en-US" sz="3200" dirty="0"/>
+          </a:p>
+          <a:p>
+            <a:pPr marL="285750" indent="-285750">
+              <a:buFont typeface="Arial" panose="020B0604020202020204" pitchFamily="34" charset="0"/>
+              <a:buChar char="•"/>
+            </a:pPr>
+            <a:r>
+              <a:rPr lang="en-US" sz="3200" dirty="0" err="1"/>
+              <a:t>IHostEnvironment</a:t>
+            </a:r>
+            <a:r>
+              <a:rPr lang="en-US" sz="3200" dirty="0"/>
+              <a:t> / </a:t>
+            </a:r>
+            <a:r>
+              <a:rPr lang="en-US" sz="3200" dirty="0" err="1"/>
+              <a:t>IWebHostEnvironment</a:t>
+            </a:r>
+            <a:endParaRPr lang="en-US" sz="3200" dirty="0"/>
           </a:p>
         </p:txBody>
       </p:sp>
     </p:spTree>
     <p:extLst>
       <p:ext uri="{BB962C8B-B14F-4D97-AF65-F5344CB8AC3E}">
-        <p14:creationId xmlns:p14="http://schemas.microsoft.com/office/powerpoint/2010/main" val="979259589"/>
+        <p14:creationId xmlns:p14="http://schemas.microsoft.com/office/powerpoint/2010/main" val="1170507424"/>
       </p:ext>
     </p:extLst>
   </p:cSld>
   <p:clrMapOvr>
     <a:masterClrMapping/>
   </p:clrMapOvr>
-  <p:timing>
-    <p:tnLst>
-      <p:par>
-        <p:cTn id="1" dur="indefinite" restart="never" nodeType="tmRoot"/>
-      </p:par>
-    </p:tnLst>
-  </p:timing>
 </p:sld>
 </file>
 
-<file path=ppt/slides/slide2.xml><?xml version="1.0" encoding="utf-8"?>
+<file path=ppt/slides/slide12.xml><?xml version="1.0" encoding="utf-8"?>
 <p:sld xmlns:a="http://schemas.openxmlformats.org/drawingml/2006/main" xmlns:r="http://schemas.openxmlformats.org/officeDocument/2006/relationships" xmlns:p="http://schemas.openxmlformats.org/presentationml/2006/main">
   <p:cSld>
     <p:bg>
@@ -4839,81 +5830,147 @@
             <p:ph type="title"/>
           </p:nvPr>
         </p:nvSpPr>
-        <p:spPr/>
-        <p:txBody>
-          <a:bodyPr/>
-          <a:lstStyle/>
-          <a:p>
-            <a:r>
-              <a:rPr lang="en-US" dirty="0" smtClean="0"/>
-              <a:t>Host</a:t>
-            </a:r>
-            <a:endParaRPr lang="en-US" dirty="0"/>
-          </a:p>
-        </p:txBody>
-      </p:sp>
-      <p:sp>
-        <p:nvSpPr>
-          <p:cNvPr id="3" name="Content Placeholder 2"/>
-          <p:cNvSpPr>
-            <a:spLocks noGrp="1"/>
-          </p:cNvSpPr>
-          <p:nvPr>
-            <p:ph idx="1"/>
-          </p:nvPr>
-        </p:nvSpPr>
         <p:spPr>
           <a:xfrm>
-            <a:off x="838199" y="1927225"/>
-            <a:ext cx="11166231" cy="4351338"/>
+            <a:off x="181708" y="60325"/>
+            <a:ext cx="10515600" cy="1325563"/>
           </a:xfrm>
         </p:spPr>
         <p:txBody>
-          <a:bodyPr>
-            <a:normAutofit/>
+          <a:bodyPr/>
+          <a:lstStyle/>
+          <a:p>
+            <a:r>
+              <a:rPr lang="en-US" dirty="0" err="1"/>
+              <a:t>IHostApplicationLifetime</a:t>
+            </a:r>
+            <a:endParaRPr lang="en-US" dirty="0"/>
+          </a:p>
+        </p:txBody>
+      </p:sp>
+      <p:sp>
+        <p:nvSpPr>
+          <p:cNvPr id="4" name="TextBox 3"/>
+          <p:cNvSpPr txBox="1"/>
+          <p:nvPr/>
+        </p:nvSpPr>
+        <p:spPr>
+          <a:xfrm>
+            <a:off x="797170" y="1761026"/>
+            <a:ext cx="11588261" cy="3539430"/>
+          </a:xfrm>
+          <a:prstGeom prst="rect">
+            <a:avLst/>
+          </a:prstGeom>
+          <a:noFill/>
+        </p:spPr>
+        <p:txBody>
+          <a:bodyPr wrap="square" rtlCol="0">
+            <a:spAutoFit/>
           </a:bodyPr>
           <a:lstStyle/>
           <a:p>
-            <a:pPr marL="0" indent="0">
-              <a:buNone/>
+            <a:r>
+              <a:rPr lang="en-US" sz="3200" dirty="0" err="1"/>
+              <a:t>CancellationToken</a:t>
+            </a:r>
+            <a:r>
+              <a:rPr lang="en-US" sz="3200" dirty="0"/>
+              <a:t> Properties:</a:t>
+            </a:r>
+          </a:p>
+          <a:p>
+            <a:endParaRPr lang="en-US" sz="3200" dirty="0"/>
+          </a:p>
+          <a:p>
+            <a:pPr marL="457200" indent="-457200">
+              <a:buFont typeface="Arial" panose="020B0604020202020204" pitchFamily="34" charset="0"/>
+              <a:buChar char="•"/>
             </a:pPr>
             <a:r>
+              <a:rPr lang="en-US" sz="3200" dirty="0" err="1"/>
+              <a:t>ApplicationStarted</a:t>
+            </a:r>
+            <a:r>
               <a:rPr lang="en-US" sz="3200" dirty="0"/>
-              <a:t>A host is an object that encapsulates an app's resources, such as:</a:t>
-            </a:r>
-          </a:p>
-          <a:p>
-            <a:pPr marL="0" indent="0">
-              <a:buNone/>
+              <a:t> – fully started</a:t>
+            </a:r>
+          </a:p>
+          <a:p>
+            <a:pPr marL="457200" indent="-457200">
+              <a:buFont typeface="Arial" panose="020B0604020202020204" pitchFamily="34" charset="0"/>
+              <a:buChar char="•"/>
+            </a:pPr>
+            <a:r>
+              <a:rPr lang="en-US" sz="3200" dirty="0" err="1"/>
+              <a:t>ApplicationStopped</a:t>
+            </a:r>
+            <a:r>
+              <a:rPr lang="en-US" sz="3200" dirty="0"/>
+              <a:t> </a:t>
+            </a:r>
+          </a:p>
+          <a:p>
+            <a:pPr marL="457200" indent="-457200">
+              <a:buFont typeface="Arial" panose="020B0604020202020204" pitchFamily="34" charset="0"/>
+              <a:buChar char="•"/>
+            </a:pPr>
+            <a:r>
+              <a:rPr lang="en-US" sz="3200" dirty="0" err="1"/>
+              <a:t>ApplicationStopping</a:t>
+            </a:r>
+            <a:endParaRPr lang="en-US" sz="3200" dirty="0"/>
+          </a:p>
+          <a:p>
+            <a:pPr marL="457200" indent="-457200">
+              <a:buFont typeface="Arial" panose="020B0604020202020204" pitchFamily="34" charset="0"/>
+              <a:buChar char="•"/>
             </a:pPr>
             <a:endParaRPr lang="en-US" sz="3200" dirty="0"/>
           </a:p>
           <a:p>
             <a:r>
+              <a:rPr lang="en-US" sz="3200" dirty="0" err="1"/>
+              <a:t>StopApplication</a:t>
+            </a:r>
+            <a:r>
               <a:rPr lang="en-US" sz="3200" dirty="0"/>
-              <a:t>Dependency injection (DI)</a:t>
-            </a:r>
-          </a:p>
+              <a:t>() method</a:t>
+            </a:r>
+          </a:p>
+        </p:txBody>
+      </p:sp>
+      <p:sp>
+        <p:nvSpPr>
+          <p:cNvPr id="3" name="TextBox 2">
+            <a:extLst>
+              <a:ext uri="{FF2B5EF4-FFF2-40B4-BE49-F238E27FC236}">
+                <a16:creationId xmlns:a16="http://schemas.microsoft.com/office/drawing/2014/main" id="{96BE9A4B-DD1D-4AE6-B9B8-7ADA56931223}"/>
+              </a:ext>
+            </a:extLst>
+          </p:cNvPr>
+          <p:cNvSpPr txBox="1"/>
+          <p:nvPr/>
+        </p:nvSpPr>
+        <p:spPr>
+          <a:xfrm>
+            <a:off x="5017477" y="3513156"/>
+            <a:ext cx="6178061" cy="584775"/>
+          </a:xfrm>
+          <a:prstGeom prst="rect">
+            <a:avLst/>
+          </a:prstGeom>
+          <a:noFill/>
+        </p:spPr>
+        <p:txBody>
+          <a:bodyPr wrap="square" rtlCol="0">
+            <a:spAutoFit/>
+          </a:bodyPr>
+          <a:lstStyle/>
           <a:p>
             <a:r>
               <a:rPr lang="en-US" sz="3200" dirty="0"/>
-              <a:t>Logging</a:t>
-            </a:r>
-          </a:p>
-          <a:p>
-            <a:r>
-              <a:rPr lang="en-US" sz="3200" dirty="0"/>
-              <a:t>Configuration</a:t>
-            </a:r>
-          </a:p>
-          <a:p>
-            <a:r>
-              <a:rPr lang="en-US" sz="3200" dirty="0" err="1"/>
-              <a:t>IHostedService</a:t>
-            </a:r>
-            <a:r>
-              <a:rPr lang="en-US" sz="3200" dirty="0"/>
-              <a:t> implementations</a:t>
+              <a:t>- Graceful shutdown, blocks</a:t>
             </a:r>
           </a:p>
         </p:txBody>
@@ -4921,24 +5978,17 @@
     </p:spTree>
     <p:extLst>
       <p:ext uri="{BB962C8B-B14F-4D97-AF65-F5344CB8AC3E}">
-        <p14:creationId xmlns:p14="http://schemas.microsoft.com/office/powerpoint/2010/main" val="4052774876"/>
+        <p14:creationId xmlns:p14="http://schemas.microsoft.com/office/powerpoint/2010/main" val="3249820148"/>
       </p:ext>
     </p:extLst>
   </p:cSld>
   <p:clrMapOvr>
     <a:masterClrMapping/>
   </p:clrMapOvr>
-  <p:timing>
-    <p:tnLst>
-      <p:par>
-        <p:cTn id="1" dur="indefinite" restart="never" nodeType="tmRoot"/>
-      </p:par>
-    </p:tnLst>
-  </p:timing>
 </p:sld>
 </file>
 
-<file path=ppt/slides/slide3.xml><?xml version="1.0" encoding="utf-8"?>
+<file path=ppt/slides/slide13.xml><?xml version="1.0" encoding="utf-8"?>
 <p:sld xmlns:a="http://schemas.openxmlformats.org/drawingml/2006/main" xmlns:r="http://schemas.openxmlformats.org/officeDocument/2006/relationships" xmlns:p="http://schemas.openxmlformats.org/presentationml/2006/main">
   <p:cSld>
     <p:bg>
@@ -4999,136 +6049,71 @@
             <p:ph type="title"/>
           </p:nvPr>
         </p:nvSpPr>
-        <p:spPr/>
-        <p:txBody>
-          <a:bodyPr/>
-          <a:lstStyle/>
-          <a:p>
-            <a:r>
-              <a:rPr lang="en-US" dirty="0" smtClean="0"/>
-              <a:t>Host</a:t>
-            </a:r>
-            <a:endParaRPr lang="en-US" dirty="0"/>
-          </a:p>
-        </p:txBody>
-      </p:sp>
-      <p:sp>
-        <p:nvSpPr>
-          <p:cNvPr id="3" name="Content Placeholder 2"/>
-          <p:cNvSpPr>
-            <a:spLocks noGrp="1"/>
-          </p:cNvSpPr>
-          <p:nvPr>
-            <p:ph idx="1"/>
-          </p:nvPr>
-        </p:nvSpPr>
         <p:spPr>
           <a:xfrm>
-            <a:off x="720968" y="1690688"/>
-            <a:ext cx="11131063" cy="4351338"/>
+            <a:off x="181708" y="60325"/>
+            <a:ext cx="10515600" cy="1325563"/>
           </a:xfrm>
         </p:spPr>
         <p:txBody>
-          <a:bodyPr>
-            <a:noAutofit/>
-          </a:bodyPr>
-          <a:lstStyle/>
-          <a:p>
-            <a:pPr marL="0" indent="0">
-              <a:buNone/>
-            </a:pPr>
-            <a:r>
-              <a:rPr lang="en-US" sz="3200" dirty="0" smtClean="0"/>
-              <a:t>Provides lifetime management. </a:t>
-            </a:r>
-          </a:p>
-          <a:p>
-            <a:pPr marL="0" indent="0">
-              <a:buNone/>
-            </a:pPr>
-            <a:endParaRPr lang="en-US" sz="3200" dirty="0" smtClean="0"/>
-          </a:p>
-          <a:p>
-            <a:pPr marL="0" indent="0">
-              <a:buNone/>
-            </a:pPr>
-            <a:r>
-              <a:rPr lang="en-US" sz="3200" dirty="0" smtClean="0"/>
-              <a:t>Startup: </a:t>
-            </a:r>
-          </a:p>
-          <a:p>
-            <a:pPr marL="0" indent="0">
-              <a:buNone/>
-            </a:pPr>
-            <a:r>
-              <a:rPr lang="en-US" dirty="0" smtClean="0"/>
-              <a:t>Calls </a:t>
-            </a:r>
-            <a:r>
-              <a:rPr lang="en-US" dirty="0" err="1" smtClean="0"/>
-              <a:t>IHostedService.StartAsync</a:t>
-            </a:r>
-            <a:r>
-              <a:rPr lang="en-US" dirty="0" smtClean="0"/>
-              <a:t> on each </a:t>
+          <a:bodyPr/>
+          <a:lstStyle/>
+          <a:p>
+            <a:r>
+              <a:rPr lang="en-US" dirty="0" err="1"/>
+              <a:t>IHostApplicationLifetime</a:t>
             </a:r>
             <a:r>
               <a:rPr lang="en-US" dirty="0"/>
-              <a:t>implementation </a:t>
-            </a:r>
-            <a:r>
-              <a:rPr lang="en-US" dirty="0" smtClean="0"/>
-              <a:t>of </a:t>
-            </a:r>
-            <a:r>
-              <a:rPr lang="en-US" dirty="0" err="1" smtClean="0"/>
-              <a:t>IHostedService</a:t>
-            </a:r>
-            <a:r>
-              <a:rPr lang="en-US" dirty="0" smtClean="0"/>
-              <a:t>. In a web app – starts an HTTP server implementation.</a:t>
-            </a:r>
-          </a:p>
-          <a:p>
-            <a:pPr marL="0" indent="0">
-              <a:buNone/>
-            </a:pPr>
-            <a:endParaRPr lang="en-US" sz="3200" dirty="0"/>
-          </a:p>
-          <a:p>
-            <a:pPr marL="0" indent="0">
-              <a:buNone/>
-            </a:pPr>
-            <a:r>
-              <a:rPr lang="en-US" sz="3200" dirty="0" smtClean="0"/>
-              <a:t>Graceful shutdown.</a:t>
-            </a:r>
-            <a:endParaRPr lang="en-US" sz="3200" dirty="0"/>
-          </a:p>
-        </p:txBody>
-      </p:sp>
+              <a:t> usage</a:t>
+            </a:r>
+          </a:p>
+        </p:txBody>
+      </p:sp>
+      <p:pic>
+        <p:nvPicPr>
+          <p:cNvPr id="6" name="Picture 5">
+            <a:extLst>
+              <a:ext uri="{FF2B5EF4-FFF2-40B4-BE49-F238E27FC236}">
+                <a16:creationId xmlns:a16="http://schemas.microsoft.com/office/drawing/2014/main" id="{EB66CF35-6701-48CA-B5E6-2D40DDB9FFBE}"/>
+              </a:ext>
+            </a:extLst>
+          </p:cNvPr>
+          <p:cNvPicPr>
+            <a:picLocks noChangeAspect="1"/>
+          </p:cNvPicPr>
+          <p:nvPr/>
+        </p:nvPicPr>
+        <p:blipFill>
+          <a:blip r:embed="rId3"/>
+          <a:stretch>
+            <a:fillRect/>
+          </a:stretch>
+        </p:blipFill>
+        <p:spPr>
+          <a:xfrm>
+            <a:off x="2193313" y="1268657"/>
+            <a:ext cx="7466502" cy="5326021"/>
+          </a:xfrm>
+          <a:prstGeom prst="rect">
+            <a:avLst/>
+          </a:prstGeom>
+        </p:spPr>
+      </p:pic>
     </p:spTree>
     <p:extLst>
       <p:ext uri="{BB962C8B-B14F-4D97-AF65-F5344CB8AC3E}">
-        <p14:creationId xmlns:p14="http://schemas.microsoft.com/office/powerpoint/2010/main" val="1943586752"/>
+        <p14:creationId xmlns:p14="http://schemas.microsoft.com/office/powerpoint/2010/main" val="1289965593"/>
       </p:ext>
     </p:extLst>
   </p:cSld>
   <p:clrMapOvr>
     <a:masterClrMapping/>
   </p:clrMapOvr>
-  <p:timing>
-    <p:tnLst>
-      <p:par>
-        <p:cTn id="1" dur="indefinite" restart="never" nodeType="tmRoot"/>
-      </p:par>
-    </p:tnLst>
-  </p:timing>
 </p:sld>
 </file>
 
-<file path=ppt/slides/slide4.xml><?xml version="1.0" encoding="utf-8"?>
+<file path=ppt/slides/slide14.xml><?xml version="1.0" encoding="utf-8"?>
 <p:sld xmlns:a="http://schemas.openxmlformats.org/drawingml/2006/main" xmlns:r="http://schemas.openxmlformats.org/officeDocument/2006/relationships" xmlns:p="http://schemas.openxmlformats.org/presentationml/2006/main">
   <p:cSld>
     <p:bg>
@@ -5189,96 +6174,101 @@
             <p:ph type="title"/>
           </p:nvPr>
         </p:nvSpPr>
-        <p:spPr/>
-        <p:txBody>
-          <a:bodyPr/>
-          <a:lstStyle/>
-          <a:p>
-            <a:r>
-              <a:rPr lang="en-US" dirty="0" smtClean="0"/>
-              <a:t>Host</a:t>
-            </a:r>
-            <a:endParaRPr lang="en-US" dirty="0"/>
-          </a:p>
-        </p:txBody>
-      </p:sp>
-      <p:sp>
-        <p:nvSpPr>
-          <p:cNvPr id="3" name="Content Placeholder 2"/>
-          <p:cNvSpPr>
-            <a:spLocks noGrp="1"/>
-          </p:cNvSpPr>
-          <p:nvPr>
-            <p:ph idx="1"/>
-          </p:nvPr>
-        </p:nvSpPr>
         <p:spPr>
           <a:xfrm>
-            <a:off x="838200" y="2506662"/>
-            <a:ext cx="11166231" cy="4351338"/>
+            <a:off x="181708" y="60325"/>
+            <a:ext cx="10515600" cy="1325563"/>
           </a:xfrm>
         </p:spPr>
         <p:txBody>
-          <a:bodyPr>
-            <a:normAutofit/>
-          </a:bodyPr>
-          <a:lstStyle/>
-          <a:p>
-            <a:pPr marL="0" indent="0">
-              <a:buNone/>
-            </a:pPr>
-            <a:r>
-              <a:rPr lang="en-US" sz="3200" dirty="0" smtClean="0"/>
-              <a:t>Generic Host – recommended.</a:t>
-            </a:r>
-          </a:p>
-          <a:p>
-            <a:pPr marL="0" indent="0">
-              <a:buNone/>
-            </a:pPr>
-            <a:endParaRPr lang="en-US" sz="3200" dirty="0" smtClean="0"/>
-          </a:p>
-          <a:p>
-            <a:pPr marL="0" indent="0">
-              <a:buNone/>
-            </a:pPr>
-            <a:r>
-              <a:rPr lang="en-US" sz="3200" dirty="0" smtClean="0"/>
-              <a:t>Web Host – not recommended, backward compatibility. Used for 			  HTTP workloads before </a:t>
-            </a:r>
-            <a:r>
-              <a:rPr lang="en-US" sz="3200" dirty="0" err="1" smtClean="0"/>
-              <a:t>.Net</a:t>
-            </a:r>
-            <a:r>
-              <a:rPr lang="en-US" sz="3200" dirty="0" smtClean="0"/>
-              <a:t> Core 3.0.</a:t>
-            </a:r>
-            <a:endParaRPr lang="en-US" sz="3200" dirty="0"/>
-          </a:p>
-        </p:txBody>
-      </p:sp>
+          <a:bodyPr/>
+          <a:lstStyle/>
+          <a:p>
+            <a:r>
+              <a:rPr lang="en-US" dirty="0" err="1"/>
+              <a:t>IHostApplicationLifetime</a:t>
+            </a:r>
+            <a:r>
+              <a:rPr lang="en-US" dirty="0"/>
+              <a:t> usage</a:t>
+            </a:r>
+          </a:p>
+        </p:txBody>
+      </p:sp>
+      <p:pic>
+        <p:nvPicPr>
+          <p:cNvPr id="4" name="Picture 3">
+            <a:extLst>
+              <a:ext uri="{FF2B5EF4-FFF2-40B4-BE49-F238E27FC236}">
+                <a16:creationId xmlns:a16="http://schemas.microsoft.com/office/drawing/2014/main" id="{FE01E79B-E171-4BB8-A0F1-7BF2DFDE5BC4}"/>
+              </a:ext>
+            </a:extLst>
+          </p:cNvPr>
+          <p:cNvPicPr>
+            <a:picLocks noChangeAspect="1"/>
+          </p:cNvPicPr>
+          <p:nvPr/>
+        </p:nvPicPr>
+        <p:blipFill>
+          <a:blip r:embed="rId3"/>
+          <a:stretch>
+            <a:fillRect/>
+          </a:stretch>
+        </p:blipFill>
+        <p:spPr>
+          <a:xfrm>
+            <a:off x="286258" y="1242656"/>
+            <a:ext cx="7080005" cy="2695108"/>
+          </a:xfrm>
+          <a:prstGeom prst="rect">
+            <a:avLst/>
+          </a:prstGeom>
+        </p:spPr>
+      </p:pic>
+      <p:pic>
+        <p:nvPicPr>
+          <p:cNvPr id="5" name="Picture 4">
+            <a:extLst>
+              <a:ext uri="{FF2B5EF4-FFF2-40B4-BE49-F238E27FC236}">
+                <a16:creationId xmlns:a16="http://schemas.microsoft.com/office/drawing/2014/main" id="{8CD0B0C6-5192-4C2D-AA63-45742CA03602}"/>
+              </a:ext>
+            </a:extLst>
+          </p:cNvPr>
+          <p:cNvPicPr>
+            <a:picLocks noChangeAspect="1"/>
+          </p:cNvPicPr>
+          <p:nvPr/>
+        </p:nvPicPr>
+        <p:blipFill>
+          <a:blip r:embed="rId4"/>
+          <a:stretch>
+            <a:fillRect/>
+          </a:stretch>
+        </p:blipFill>
+        <p:spPr>
+          <a:xfrm>
+            <a:off x="4927073" y="3336435"/>
+            <a:ext cx="6978669" cy="3461240"/>
+          </a:xfrm>
+          <a:prstGeom prst="rect">
+            <a:avLst/>
+          </a:prstGeom>
+        </p:spPr>
+      </p:pic>
     </p:spTree>
     <p:extLst>
       <p:ext uri="{BB962C8B-B14F-4D97-AF65-F5344CB8AC3E}">
-        <p14:creationId xmlns:p14="http://schemas.microsoft.com/office/powerpoint/2010/main" val="3752328964"/>
+        <p14:creationId xmlns:p14="http://schemas.microsoft.com/office/powerpoint/2010/main" val="2581529083"/>
       </p:ext>
     </p:extLst>
   </p:cSld>
   <p:clrMapOvr>
     <a:masterClrMapping/>
   </p:clrMapOvr>
-  <p:timing>
-    <p:tnLst>
-      <p:par>
-        <p:cTn id="1" dur="indefinite" restart="never" nodeType="tmRoot"/>
-      </p:par>
-    </p:tnLst>
-  </p:timing>
 </p:sld>
 </file>
 
-<file path=ppt/slides/slide5.xml><?xml version="1.0" encoding="utf-8"?>
+<file path=ppt/slides/slide15.xml><?xml version="1.0" encoding="utf-8"?>
 <p:sld xmlns:a="http://schemas.openxmlformats.org/drawingml/2006/main" xmlns:r="http://schemas.openxmlformats.org/officeDocument/2006/relationships" xmlns:p="http://schemas.openxmlformats.org/presentationml/2006/main">
   <p:cSld>
     <p:bg>
@@ -5350,14 +6340,1408 @@
           <a:lstStyle/>
           <a:p>
             <a:r>
-              <a:rPr lang="en-US" dirty="0" smtClean="0"/>
-              <a:t>Generic </a:t>
-            </a:r>
-            <a:r>
-              <a:rPr lang="en-US" dirty="0" smtClean="0"/>
-              <a:t>Host (non-http workload)</a:t>
+              <a:rPr lang="en-US" dirty="0" err="1"/>
+              <a:t>IHostLifetime</a:t>
             </a:r>
             <a:endParaRPr lang="en-US" dirty="0"/>
+          </a:p>
+        </p:txBody>
+      </p:sp>
+      <p:sp>
+        <p:nvSpPr>
+          <p:cNvPr id="3" name="TextBox 2">
+            <a:extLst>
+              <a:ext uri="{FF2B5EF4-FFF2-40B4-BE49-F238E27FC236}">
+                <a16:creationId xmlns:a16="http://schemas.microsoft.com/office/drawing/2014/main" id="{ADDF9C7B-D1A4-43C4-8257-A0442BD6194E}"/>
+              </a:ext>
+            </a:extLst>
+          </p:cNvPr>
+          <p:cNvSpPr txBox="1"/>
+          <p:nvPr/>
+        </p:nvSpPr>
+        <p:spPr>
+          <a:xfrm>
+            <a:off x="474785" y="1659285"/>
+            <a:ext cx="12162692" cy="4401205"/>
+          </a:xfrm>
+          <a:prstGeom prst="rect">
+            <a:avLst/>
+          </a:prstGeom>
+          <a:noFill/>
+        </p:spPr>
+        <p:txBody>
+          <a:bodyPr wrap="square" rtlCol="0">
+            <a:spAutoFit/>
+          </a:bodyPr>
+          <a:lstStyle/>
+          <a:p>
+            <a:r>
+              <a:rPr lang="ru-RU" sz="2800" dirty="0"/>
+              <a:t>С</a:t>
+            </a:r>
+            <a:r>
+              <a:rPr lang="en-US" sz="2800" dirty="0" err="1"/>
+              <a:t>ontrols</a:t>
+            </a:r>
+            <a:r>
+              <a:rPr lang="en-US" sz="2800" dirty="0"/>
+              <a:t> when the host starts and when it stops. </a:t>
+            </a:r>
+            <a:endParaRPr lang="ru-RU" sz="2800" dirty="0"/>
+          </a:p>
+          <a:p>
+            <a:r>
+              <a:rPr lang="en-US" sz="2800" dirty="0"/>
+              <a:t>The last implementation registered is used.</a:t>
+            </a:r>
+            <a:endParaRPr lang="ru-RU" sz="2800" dirty="0"/>
+          </a:p>
+          <a:p>
+            <a:endParaRPr lang="en-US" sz="2800" dirty="0"/>
+          </a:p>
+          <a:p>
+            <a:endParaRPr lang="ru-RU" sz="2800" dirty="0"/>
+          </a:p>
+          <a:p>
+            <a:r>
+              <a:rPr lang="en-US" sz="2800" dirty="0" err="1"/>
+              <a:t>ConsoleLifetime</a:t>
+            </a:r>
+            <a:r>
+              <a:rPr lang="en-US" sz="2800" dirty="0"/>
+              <a:t> is the default </a:t>
+            </a:r>
+            <a:r>
+              <a:rPr lang="en-US" sz="2800" dirty="0" err="1"/>
+              <a:t>IHostLifetime</a:t>
+            </a:r>
+            <a:r>
+              <a:rPr lang="en-US" sz="2800" dirty="0"/>
+              <a:t> implementation.</a:t>
+            </a:r>
+            <a:endParaRPr lang="ru-RU" sz="2800" dirty="0"/>
+          </a:p>
+          <a:p>
+            <a:endParaRPr lang="en-US" sz="2800" dirty="0"/>
+          </a:p>
+          <a:p>
+            <a:endParaRPr lang="ru-RU" sz="2800" dirty="0"/>
+          </a:p>
+          <a:p>
+            <a:r>
+              <a:rPr lang="en-US" sz="2800" dirty="0"/>
+              <a:t>Listens for </a:t>
+            </a:r>
+            <a:r>
+              <a:rPr lang="en-US" sz="2800" dirty="0" err="1"/>
+              <a:t>Ctrl+C</a:t>
+            </a:r>
+            <a:r>
+              <a:rPr lang="en-US" sz="2800" dirty="0"/>
+              <a:t>/SIGINT or SIGTERM and calls </a:t>
+            </a:r>
+            <a:r>
+              <a:rPr lang="en-US" sz="2800" dirty="0" err="1"/>
+              <a:t>StopApplication</a:t>
+            </a:r>
+            <a:r>
+              <a:rPr lang="en-US" sz="2800" dirty="0"/>
+              <a:t> to start the shutdown process.</a:t>
+            </a:r>
+          </a:p>
+          <a:p>
+            <a:r>
+              <a:rPr lang="en-US" sz="2800" dirty="0"/>
+              <a:t>Unblocks extensions such as </a:t>
+            </a:r>
+            <a:r>
+              <a:rPr lang="en-US" sz="2800" dirty="0" err="1"/>
+              <a:t>RunAsync</a:t>
+            </a:r>
+            <a:r>
+              <a:rPr lang="en-US" sz="2800" dirty="0"/>
+              <a:t> and </a:t>
+            </a:r>
+            <a:r>
+              <a:rPr lang="en-US" sz="2800" dirty="0" err="1"/>
+              <a:t>WaitForShutdownAsync</a:t>
+            </a:r>
+            <a:r>
+              <a:rPr lang="en-US" sz="2800" dirty="0"/>
+              <a:t>.</a:t>
+            </a:r>
+          </a:p>
+        </p:txBody>
+      </p:sp>
+    </p:spTree>
+    <p:extLst>
+      <p:ext uri="{BB962C8B-B14F-4D97-AF65-F5344CB8AC3E}">
+        <p14:creationId xmlns:p14="http://schemas.microsoft.com/office/powerpoint/2010/main" val="2397822808"/>
+      </p:ext>
+    </p:extLst>
+  </p:cSld>
+  <p:clrMapOvr>
+    <a:masterClrMapping/>
+  </p:clrMapOvr>
+</p:sld>
+</file>
+
+<file path=ppt/slides/slide16.xml><?xml version="1.0" encoding="utf-8"?>
+<p:sld xmlns:a="http://schemas.openxmlformats.org/drawingml/2006/main" xmlns:r="http://schemas.openxmlformats.org/officeDocument/2006/relationships" xmlns:p="http://schemas.openxmlformats.org/presentationml/2006/main">
+  <p:cSld>
+    <p:bg>
+      <p:bgPr>
+        <a:gradFill>
+          <a:gsLst>
+            <a:gs pos="0">
+              <a:schemeClr val="accent1">
+                <a:lumMod val="5000"/>
+                <a:lumOff val="95000"/>
+              </a:schemeClr>
+            </a:gs>
+            <a:gs pos="42000">
+              <a:schemeClr val="accent1">
+                <a:lumMod val="45000"/>
+                <a:lumOff val="55000"/>
+              </a:schemeClr>
+            </a:gs>
+            <a:gs pos="83000">
+              <a:schemeClr val="accent1">
+                <a:lumMod val="45000"/>
+                <a:lumOff val="55000"/>
+              </a:schemeClr>
+            </a:gs>
+            <a:gs pos="100000">
+              <a:schemeClr val="accent1">
+                <a:lumMod val="30000"/>
+                <a:lumOff val="70000"/>
+              </a:schemeClr>
+            </a:gs>
+          </a:gsLst>
+          <a:lin ang="5400000" scaled="1"/>
+        </a:gradFill>
+        <a:effectLst/>
+      </p:bgPr>
+    </p:bg>
+    <p:spTree>
+      <p:nvGrpSpPr>
+        <p:cNvPr id="1" name=""/>
+        <p:cNvGrpSpPr/>
+        <p:nvPr/>
+      </p:nvGrpSpPr>
+      <p:grpSpPr>
+        <a:xfrm>
+          <a:off x="0" y="0"/>
+          <a:ext cx="0" cy="0"/>
+          <a:chOff x="0" y="0"/>
+          <a:chExt cx="0" cy="0"/>
+        </a:xfrm>
+      </p:grpSpPr>
+      <p:sp>
+        <p:nvSpPr>
+          <p:cNvPr id="2" name="Title 1"/>
+          <p:cNvSpPr>
+            <a:spLocks noGrp="1"/>
+          </p:cNvSpPr>
+          <p:nvPr>
+            <p:ph type="title"/>
+          </p:nvPr>
+        </p:nvSpPr>
+        <p:spPr>
+          <a:xfrm>
+            <a:off x="181708" y="60325"/>
+            <a:ext cx="10515600" cy="1325563"/>
+          </a:xfrm>
+        </p:spPr>
+        <p:txBody>
+          <a:bodyPr/>
+          <a:lstStyle/>
+          <a:p>
+            <a:r>
+              <a:rPr lang="en-US" dirty="0" err="1"/>
+              <a:t>IHostEnvironment</a:t>
+            </a:r>
+            <a:endParaRPr lang="en-US" dirty="0"/>
+          </a:p>
+        </p:txBody>
+      </p:sp>
+      <p:sp>
+        <p:nvSpPr>
+          <p:cNvPr id="3" name="TextBox 2">
+            <a:extLst>
+              <a:ext uri="{FF2B5EF4-FFF2-40B4-BE49-F238E27FC236}">
+                <a16:creationId xmlns:a16="http://schemas.microsoft.com/office/drawing/2014/main" id="{ADDF9C7B-D1A4-43C4-8257-A0442BD6194E}"/>
+              </a:ext>
+            </a:extLst>
+          </p:cNvPr>
+          <p:cNvSpPr txBox="1"/>
+          <p:nvPr/>
+        </p:nvSpPr>
+        <p:spPr>
+          <a:xfrm>
+            <a:off x="474785" y="1659285"/>
+            <a:ext cx="12162692" cy="3970318"/>
+          </a:xfrm>
+          <a:prstGeom prst="rect">
+            <a:avLst/>
+          </a:prstGeom>
+          <a:noFill/>
+        </p:spPr>
+        <p:txBody>
+          <a:bodyPr wrap="square" rtlCol="0">
+            <a:spAutoFit/>
+          </a:bodyPr>
+          <a:lstStyle/>
+          <a:p>
+            <a:r>
+              <a:rPr lang="en-US" sz="2800" dirty="0"/>
+              <a:t>Provides information about:</a:t>
+            </a:r>
+          </a:p>
+          <a:p>
+            <a:pPr marL="457200" indent="-457200">
+              <a:buFont typeface="Arial" panose="020B0604020202020204" pitchFamily="34" charset="0"/>
+              <a:buChar char="•"/>
+            </a:pPr>
+            <a:r>
+              <a:rPr lang="en-US" sz="2800" dirty="0" err="1"/>
+              <a:t>ApplicationName</a:t>
+            </a:r>
+            <a:endParaRPr lang="en-US" sz="2800" dirty="0"/>
+          </a:p>
+          <a:p>
+            <a:pPr marL="457200" indent="-457200">
+              <a:buFont typeface="Arial" panose="020B0604020202020204" pitchFamily="34" charset="0"/>
+              <a:buChar char="•"/>
+            </a:pPr>
+            <a:r>
+              <a:rPr lang="en-US" sz="2800" dirty="0" err="1"/>
+              <a:t>EnvironmentName</a:t>
+            </a:r>
+            <a:endParaRPr lang="en-US" sz="2800" dirty="0"/>
+          </a:p>
+          <a:p>
+            <a:pPr marL="457200" indent="-457200">
+              <a:buFont typeface="Arial" panose="020B0604020202020204" pitchFamily="34" charset="0"/>
+              <a:buChar char="•"/>
+            </a:pPr>
+            <a:r>
+              <a:rPr lang="en-US" sz="2800" dirty="0" err="1"/>
+              <a:t>ContentRootPath</a:t>
+            </a:r>
+            <a:endParaRPr lang="en-US" sz="2800" dirty="0"/>
+          </a:p>
+          <a:p>
+            <a:endParaRPr lang="en-US" sz="2800" dirty="0"/>
+          </a:p>
+          <a:p>
+            <a:r>
+              <a:rPr lang="en-US" sz="2800" dirty="0"/>
+              <a:t>Web apps implement the </a:t>
+            </a:r>
+            <a:r>
+              <a:rPr lang="en-US" sz="2800" dirty="0" err="1"/>
+              <a:t>IWebHostEnvironment</a:t>
+            </a:r>
+            <a:r>
+              <a:rPr lang="en-US" sz="2800" dirty="0"/>
+              <a:t> interface, which inherits </a:t>
+            </a:r>
+            <a:r>
+              <a:rPr lang="en-US" sz="2800" dirty="0" err="1"/>
+              <a:t>IHostEnvironment</a:t>
+            </a:r>
+            <a:r>
+              <a:rPr lang="en-US" sz="2800" dirty="0"/>
+              <a:t> and adds:</a:t>
+            </a:r>
+          </a:p>
+          <a:p>
+            <a:endParaRPr lang="en-US" sz="2800" dirty="0"/>
+          </a:p>
+          <a:p>
+            <a:pPr marL="457200" indent="-457200">
+              <a:buFont typeface="Arial" panose="020B0604020202020204" pitchFamily="34" charset="0"/>
+              <a:buChar char="•"/>
+            </a:pPr>
+            <a:r>
+              <a:rPr lang="en-US" sz="2800" dirty="0" err="1"/>
+              <a:t>WebRootPath</a:t>
+            </a:r>
+            <a:endParaRPr lang="en-US" sz="2800" dirty="0"/>
+          </a:p>
+        </p:txBody>
+      </p:sp>
+    </p:spTree>
+    <p:extLst>
+      <p:ext uri="{BB962C8B-B14F-4D97-AF65-F5344CB8AC3E}">
+        <p14:creationId xmlns:p14="http://schemas.microsoft.com/office/powerpoint/2010/main" val="4091627913"/>
+      </p:ext>
+    </p:extLst>
+  </p:cSld>
+  <p:clrMapOvr>
+    <a:masterClrMapping/>
+  </p:clrMapOvr>
+</p:sld>
+</file>
+
+<file path=ppt/slides/slide17.xml><?xml version="1.0" encoding="utf-8"?>
+<p:sld xmlns:a="http://schemas.openxmlformats.org/drawingml/2006/main" xmlns:r="http://schemas.openxmlformats.org/officeDocument/2006/relationships" xmlns:p="http://schemas.openxmlformats.org/presentationml/2006/main">
+  <p:cSld>
+    <p:bg>
+      <p:bgPr>
+        <a:gradFill>
+          <a:gsLst>
+            <a:gs pos="0">
+              <a:schemeClr val="accent1">
+                <a:lumMod val="5000"/>
+                <a:lumOff val="95000"/>
+              </a:schemeClr>
+            </a:gs>
+            <a:gs pos="42000">
+              <a:schemeClr val="accent1">
+                <a:lumMod val="45000"/>
+                <a:lumOff val="55000"/>
+              </a:schemeClr>
+            </a:gs>
+            <a:gs pos="83000">
+              <a:schemeClr val="accent1">
+                <a:lumMod val="45000"/>
+                <a:lumOff val="55000"/>
+              </a:schemeClr>
+            </a:gs>
+            <a:gs pos="100000">
+              <a:schemeClr val="accent1">
+                <a:lumMod val="30000"/>
+                <a:lumOff val="70000"/>
+              </a:schemeClr>
+            </a:gs>
+          </a:gsLst>
+          <a:lin ang="5400000" scaled="1"/>
+        </a:gradFill>
+        <a:effectLst/>
+      </p:bgPr>
+    </p:bg>
+    <p:spTree>
+      <p:nvGrpSpPr>
+        <p:cNvPr id="1" name=""/>
+        <p:cNvGrpSpPr/>
+        <p:nvPr/>
+      </p:nvGrpSpPr>
+      <p:grpSpPr>
+        <a:xfrm>
+          <a:off x="0" y="0"/>
+          <a:ext cx="0" cy="0"/>
+          <a:chOff x="0" y="0"/>
+          <a:chExt cx="0" cy="0"/>
+        </a:xfrm>
+      </p:grpSpPr>
+      <p:sp>
+        <p:nvSpPr>
+          <p:cNvPr id="2" name="Title 1"/>
+          <p:cNvSpPr>
+            <a:spLocks noGrp="1"/>
+          </p:cNvSpPr>
+          <p:nvPr>
+            <p:ph type="title"/>
+          </p:nvPr>
+        </p:nvSpPr>
+        <p:spPr>
+          <a:xfrm>
+            <a:off x="181708" y="60325"/>
+            <a:ext cx="10515600" cy="1325563"/>
+          </a:xfrm>
+        </p:spPr>
+        <p:txBody>
+          <a:bodyPr/>
+          <a:lstStyle/>
+          <a:p>
+            <a:r>
+              <a:rPr lang="en-US" dirty="0"/>
+              <a:t>Header</a:t>
+            </a:r>
+          </a:p>
+        </p:txBody>
+      </p:sp>
+      <p:sp>
+        <p:nvSpPr>
+          <p:cNvPr id="3" name="TextBox 2">
+            <a:extLst>
+              <a:ext uri="{FF2B5EF4-FFF2-40B4-BE49-F238E27FC236}">
+                <a16:creationId xmlns:a16="http://schemas.microsoft.com/office/drawing/2014/main" id="{ADDF9C7B-D1A4-43C4-8257-A0442BD6194E}"/>
+              </a:ext>
+            </a:extLst>
+          </p:cNvPr>
+          <p:cNvSpPr txBox="1"/>
+          <p:nvPr/>
+        </p:nvSpPr>
+        <p:spPr>
+          <a:xfrm>
+            <a:off x="474785" y="1659285"/>
+            <a:ext cx="12162692" cy="523220"/>
+          </a:xfrm>
+          <a:prstGeom prst="rect">
+            <a:avLst/>
+          </a:prstGeom>
+          <a:noFill/>
+        </p:spPr>
+        <p:txBody>
+          <a:bodyPr wrap="square" rtlCol="0">
+            <a:spAutoFit/>
+          </a:bodyPr>
+          <a:lstStyle/>
+          <a:p>
+            <a:r>
+              <a:rPr lang="en-US" sz="2800" dirty="0"/>
+              <a:t>text</a:t>
+            </a:r>
+          </a:p>
+        </p:txBody>
+      </p:sp>
+    </p:spTree>
+    <p:extLst>
+      <p:ext uri="{BB962C8B-B14F-4D97-AF65-F5344CB8AC3E}">
+        <p14:creationId xmlns:p14="http://schemas.microsoft.com/office/powerpoint/2010/main" val="632925846"/>
+      </p:ext>
+    </p:extLst>
+  </p:cSld>
+  <p:clrMapOvr>
+    <a:masterClrMapping/>
+  </p:clrMapOvr>
+</p:sld>
+</file>
+
+<file path=ppt/slides/slide18.xml><?xml version="1.0" encoding="utf-8"?>
+<p:sld xmlns:a="http://schemas.openxmlformats.org/drawingml/2006/main" xmlns:r="http://schemas.openxmlformats.org/officeDocument/2006/relationships" xmlns:p="http://schemas.openxmlformats.org/presentationml/2006/main">
+  <p:cSld>
+    <p:bg>
+      <p:bgPr>
+        <a:gradFill>
+          <a:gsLst>
+            <a:gs pos="0">
+              <a:schemeClr val="accent1">
+                <a:lumMod val="5000"/>
+                <a:lumOff val="95000"/>
+              </a:schemeClr>
+            </a:gs>
+            <a:gs pos="42000">
+              <a:schemeClr val="accent1">
+                <a:lumMod val="45000"/>
+                <a:lumOff val="55000"/>
+              </a:schemeClr>
+            </a:gs>
+            <a:gs pos="83000">
+              <a:schemeClr val="accent1">
+                <a:lumMod val="45000"/>
+                <a:lumOff val="55000"/>
+              </a:schemeClr>
+            </a:gs>
+            <a:gs pos="100000">
+              <a:schemeClr val="accent1">
+                <a:lumMod val="30000"/>
+                <a:lumOff val="70000"/>
+              </a:schemeClr>
+            </a:gs>
+          </a:gsLst>
+          <a:lin ang="5400000" scaled="1"/>
+        </a:gradFill>
+        <a:effectLst/>
+      </p:bgPr>
+    </p:bg>
+    <p:spTree>
+      <p:nvGrpSpPr>
+        <p:cNvPr id="1" name=""/>
+        <p:cNvGrpSpPr/>
+        <p:nvPr/>
+      </p:nvGrpSpPr>
+      <p:grpSpPr>
+        <a:xfrm>
+          <a:off x="0" y="0"/>
+          <a:ext cx="0" cy="0"/>
+          <a:chOff x="0" y="0"/>
+          <a:chExt cx="0" cy="0"/>
+        </a:xfrm>
+      </p:grpSpPr>
+      <p:sp>
+        <p:nvSpPr>
+          <p:cNvPr id="2" name="Title 1"/>
+          <p:cNvSpPr>
+            <a:spLocks noGrp="1"/>
+          </p:cNvSpPr>
+          <p:nvPr>
+            <p:ph type="title"/>
+          </p:nvPr>
+        </p:nvSpPr>
+        <p:spPr>
+          <a:xfrm>
+            <a:off x="181708" y="60325"/>
+            <a:ext cx="10515600" cy="1325563"/>
+          </a:xfrm>
+        </p:spPr>
+        <p:txBody>
+          <a:bodyPr/>
+          <a:lstStyle/>
+          <a:p>
+            <a:r>
+              <a:rPr lang="en-US" dirty="0"/>
+              <a:t>Header</a:t>
+            </a:r>
+          </a:p>
+        </p:txBody>
+      </p:sp>
+      <p:sp>
+        <p:nvSpPr>
+          <p:cNvPr id="3" name="TextBox 2">
+            <a:extLst>
+              <a:ext uri="{FF2B5EF4-FFF2-40B4-BE49-F238E27FC236}">
+                <a16:creationId xmlns:a16="http://schemas.microsoft.com/office/drawing/2014/main" id="{ADDF9C7B-D1A4-43C4-8257-A0442BD6194E}"/>
+              </a:ext>
+            </a:extLst>
+          </p:cNvPr>
+          <p:cNvSpPr txBox="1"/>
+          <p:nvPr/>
+        </p:nvSpPr>
+        <p:spPr>
+          <a:xfrm>
+            <a:off x="474785" y="1659285"/>
+            <a:ext cx="12162692" cy="523220"/>
+          </a:xfrm>
+          <a:prstGeom prst="rect">
+            <a:avLst/>
+          </a:prstGeom>
+          <a:noFill/>
+        </p:spPr>
+        <p:txBody>
+          <a:bodyPr wrap="square" rtlCol="0">
+            <a:spAutoFit/>
+          </a:bodyPr>
+          <a:lstStyle/>
+          <a:p>
+            <a:r>
+              <a:rPr lang="en-US" sz="2800" dirty="0"/>
+              <a:t>text</a:t>
+            </a:r>
+          </a:p>
+        </p:txBody>
+      </p:sp>
+    </p:spTree>
+    <p:extLst>
+      <p:ext uri="{BB962C8B-B14F-4D97-AF65-F5344CB8AC3E}">
+        <p14:creationId xmlns:p14="http://schemas.microsoft.com/office/powerpoint/2010/main" val="1950471487"/>
+      </p:ext>
+    </p:extLst>
+  </p:cSld>
+  <p:clrMapOvr>
+    <a:masterClrMapping/>
+  </p:clrMapOvr>
+</p:sld>
+</file>
+
+<file path=ppt/slides/slide19.xml><?xml version="1.0" encoding="utf-8"?>
+<p:sld xmlns:a="http://schemas.openxmlformats.org/drawingml/2006/main" xmlns:r="http://schemas.openxmlformats.org/officeDocument/2006/relationships" xmlns:p="http://schemas.openxmlformats.org/presentationml/2006/main">
+  <p:cSld>
+    <p:bg>
+      <p:bgPr>
+        <a:gradFill>
+          <a:gsLst>
+            <a:gs pos="0">
+              <a:schemeClr val="accent1">
+                <a:lumMod val="5000"/>
+                <a:lumOff val="95000"/>
+              </a:schemeClr>
+            </a:gs>
+            <a:gs pos="42000">
+              <a:schemeClr val="accent1">
+                <a:lumMod val="45000"/>
+                <a:lumOff val="55000"/>
+              </a:schemeClr>
+            </a:gs>
+            <a:gs pos="83000">
+              <a:schemeClr val="accent1">
+                <a:lumMod val="45000"/>
+                <a:lumOff val="55000"/>
+              </a:schemeClr>
+            </a:gs>
+            <a:gs pos="100000">
+              <a:schemeClr val="accent1">
+                <a:lumMod val="30000"/>
+                <a:lumOff val="70000"/>
+              </a:schemeClr>
+            </a:gs>
+          </a:gsLst>
+          <a:lin ang="5400000" scaled="1"/>
+        </a:gradFill>
+        <a:effectLst/>
+      </p:bgPr>
+    </p:bg>
+    <p:spTree>
+      <p:nvGrpSpPr>
+        <p:cNvPr id="1" name=""/>
+        <p:cNvGrpSpPr/>
+        <p:nvPr/>
+      </p:nvGrpSpPr>
+      <p:grpSpPr>
+        <a:xfrm>
+          <a:off x="0" y="0"/>
+          <a:ext cx="0" cy="0"/>
+          <a:chOff x="0" y="0"/>
+          <a:chExt cx="0" cy="0"/>
+        </a:xfrm>
+      </p:grpSpPr>
+      <p:sp>
+        <p:nvSpPr>
+          <p:cNvPr id="2" name="Title 1"/>
+          <p:cNvSpPr>
+            <a:spLocks noGrp="1"/>
+          </p:cNvSpPr>
+          <p:nvPr>
+            <p:ph type="title"/>
+          </p:nvPr>
+        </p:nvSpPr>
+        <p:spPr>
+          <a:xfrm>
+            <a:off x="181708" y="60325"/>
+            <a:ext cx="10515600" cy="1325563"/>
+          </a:xfrm>
+        </p:spPr>
+        <p:txBody>
+          <a:bodyPr/>
+          <a:lstStyle/>
+          <a:p>
+            <a:r>
+              <a:rPr lang="en-US" dirty="0"/>
+              <a:t>Header</a:t>
+            </a:r>
+          </a:p>
+        </p:txBody>
+      </p:sp>
+      <p:sp>
+        <p:nvSpPr>
+          <p:cNvPr id="3" name="TextBox 2">
+            <a:extLst>
+              <a:ext uri="{FF2B5EF4-FFF2-40B4-BE49-F238E27FC236}">
+                <a16:creationId xmlns:a16="http://schemas.microsoft.com/office/drawing/2014/main" id="{ADDF9C7B-D1A4-43C4-8257-A0442BD6194E}"/>
+              </a:ext>
+            </a:extLst>
+          </p:cNvPr>
+          <p:cNvSpPr txBox="1"/>
+          <p:nvPr/>
+        </p:nvSpPr>
+        <p:spPr>
+          <a:xfrm>
+            <a:off x="474785" y="1659285"/>
+            <a:ext cx="12162692" cy="523220"/>
+          </a:xfrm>
+          <a:prstGeom prst="rect">
+            <a:avLst/>
+          </a:prstGeom>
+          <a:noFill/>
+        </p:spPr>
+        <p:txBody>
+          <a:bodyPr wrap="square" rtlCol="0">
+            <a:spAutoFit/>
+          </a:bodyPr>
+          <a:lstStyle/>
+          <a:p>
+            <a:r>
+              <a:rPr lang="en-US" sz="2800" dirty="0"/>
+              <a:t>text</a:t>
+            </a:r>
+          </a:p>
+        </p:txBody>
+      </p:sp>
+    </p:spTree>
+    <p:extLst>
+      <p:ext uri="{BB962C8B-B14F-4D97-AF65-F5344CB8AC3E}">
+        <p14:creationId xmlns:p14="http://schemas.microsoft.com/office/powerpoint/2010/main" val="4106568677"/>
+      </p:ext>
+    </p:extLst>
+  </p:cSld>
+  <p:clrMapOvr>
+    <a:masterClrMapping/>
+  </p:clrMapOvr>
+</p:sld>
+</file>
+
+<file path=ppt/slides/slide2.xml><?xml version="1.0" encoding="utf-8"?>
+<p:sld xmlns:a="http://schemas.openxmlformats.org/drawingml/2006/main" xmlns:r="http://schemas.openxmlformats.org/officeDocument/2006/relationships" xmlns:p="http://schemas.openxmlformats.org/presentationml/2006/main">
+  <p:cSld>
+    <p:bg>
+      <p:bgPr>
+        <a:gradFill>
+          <a:gsLst>
+            <a:gs pos="0">
+              <a:schemeClr val="accent1">
+                <a:lumMod val="5000"/>
+                <a:lumOff val="95000"/>
+              </a:schemeClr>
+            </a:gs>
+            <a:gs pos="42000">
+              <a:schemeClr val="accent1">
+                <a:lumMod val="45000"/>
+                <a:lumOff val="55000"/>
+              </a:schemeClr>
+            </a:gs>
+            <a:gs pos="83000">
+              <a:schemeClr val="accent1">
+                <a:lumMod val="45000"/>
+                <a:lumOff val="55000"/>
+              </a:schemeClr>
+            </a:gs>
+            <a:gs pos="100000">
+              <a:schemeClr val="accent1">
+                <a:lumMod val="30000"/>
+                <a:lumOff val="70000"/>
+              </a:schemeClr>
+            </a:gs>
+          </a:gsLst>
+          <a:lin ang="5400000" scaled="1"/>
+        </a:gradFill>
+        <a:effectLst/>
+      </p:bgPr>
+    </p:bg>
+    <p:spTree>
+      <p:nvGrpSpPr>
+        <p:cNvPr id="1" name=""/>
+        <p:cNvGrpSpPr/>
+        <p:nvPr/>
+      </p:nvGrpSpPr>
+      <p:grpSpPr>
+        <a:xfrm>
+          <a:off x="0" y="0"/>
+          <a:ext cx="0" cy="0"/>
+          <a:chOff x="0" y="0"/>
+          <a:chExt cx="0" cy="0"/>
+        </a:xfrm>
+      </p:grpSpPr>
+      <p:sp>
+        <p:nvSpPr>
+          <p:cNvPr id="2" name="Title 1"/>
+          <p:cNvSpPr>
+            <a:spLocks noGrp="1"/>
+          </p:cNvSpPr>
+          <p:nvPr>
+            <p:ph type="title"/>
+          </p:nvPr>
+        </p:nvSpPr>
+        <p:spPr/>
+        <p:txBody>
+          <a:bodyPr/>
+          <a:lstStyle/>
+          <a:p>
+            <a:r>
+              <a:rPr lang="en-US" dirty="0"/>
+              <a:t>Host</a:t>
+            </a:r>
+          </a:p>
+        </p:txBody>
+      </p:sp>
+      <p:sp>
+        <p:nvSpPr>
+          <p:cNvPr id="3" name="Content Placeholder 2"/>
+          <p:cNvSpPr>
+            <a:spLocks noGrp="1"/>
+          </p:cNvSpPr>
+          <p:nvPr>
+            <p:ph idx="1"/>
+          </p:nvPr>
+        </p:nvSpPr>
+        <p:spPr>
+          <a:xfrm>
+            <a:off x="838199" y="1927225"/>
+            <a:ext cx="11166231" cy="4351338"/>
+          </a:xfrm>
+        </p:spPr>
+        <p:txBody>
+          <a:bodyPr>
+            <a:normAutofit/>
+          </a:bodyPr>
+          <a:lstStyle/>
+          <a:p>
+            <a:pPr marL="0" indent="0">
+              <a:buNone/>
+            </a:pPr>
+            <a:r>
+              <a:rPr lang="en-US" sz="3200" dirty="0"/>
+              <a:t>A host is an object that encapsulates an app's resources, such as:</a:t>
+            </a:r>
+          </a:p>
+          <a:p>
+            <a:pPr marL="0" indent="0">
+              <a:buNone/>
+            </a:pPr>
+            <a:endParaRPr lang="en-US" sz="3200" dirty="0"/>
+          </a:p>
+          <a:p>
+            <a:r>
+              <a:rPr lang="en-US" sz="3200" dirty="0"/>
+              <a:t>Dependency injection (DI)</a:t>
+            </a:r>
+          </a:p>
+          <a:p>
+            <a:r>
+              <a:rPr lang="en-US" sz="3200" dirty="0"/>
+              <a:t>Logging</a:t>
+            </a:r>
+          </a:p>
+          <a:p>
+            <a:r>
+              <a:rPr lang="en-US" sz="3200" dirty="0"/>
+              <a:t>Configuration</a:t>
+            </a:r>
+          </a:p>
+          <a:p>
+            <a:r>
+              <a:rPr lang="en-US" sz="3200" dirty="0" err="1"/>
+              <a:t>IHostedService</a:t>
+            </a:r>
+            <a:r>
+              <a:rPr lang="en-US" sz="3200" dirty="0"/>
+              <a:t> implementations</a:t>
+            </a:r>
+          </a:p>
+        </p:txBody>
+      </p:sp>
+    </p:spTree>
+    <p:extLst>
+      <p:ext uri="{BB962C8B-B14F-4D97-AF65-F5344CB8AC3E}">
+        <p14:creationId xmlns:p14="http://schemas.microsoft.com/office/powerpoint/2010/main" val="4052774876"/>
+      </p:ext>
+    </p:extLst>
+  </p:cSld>
+  <p:clrMapOvr>
+    <a:masterClrMapping/>
+  </p:clrMapOvr>
+</p:sld>
+</file>
+
+<file path=ppt/slides/slide20.xml><?xml version="1.0" encoding="utf-8"?>
+<p:sld xmlns:a="http://schemas.openxmlformats.org/drawingml/2006/main" xmlns:r="http://schemas.openxmlformats.org/officeDocument/2006/relationships" xmlns:p="http://schemas.openxmlformats.org/presentationml/2006/main">
+  <p:cSld>
+    <p:bg>
+      <p:bgPr>
+        <a:gradFill>
+          <a:gsLst>
+            <a:gs pos="0">
+              <a:schemeClr val="accent1">
+                <a:lumMod val="5000"/>
+                <a:lumOff val="95000"/>
+              </a:schemeClr>
+            </a:gs>
+            <a:gs pos="42000">
+              <a:schemeClr val="accent1">
+                <a:lumMod val="45000"/>
+                <a:lumOff val="55000"/>
+              </a:schemeClr>
+            </a:gs>
+            <a:gs pos="83000">
+              <a:schemeClr val="accent1">
+                <a:lumMod val="45000"/>
+                <a:lumOff val="55000"/>
+              </a:schemeClr>
+            </a:gs>
+            <a:gs pos="100000">
+              <a:schemeClr val="accent1">
+                <a:lumMod val="30000"/>
+                <a:lumOff val="70000"/>
+              </a:schemeClr>
+            </a:gs>
+          </a:gsLst>
+          <a:lin ang="5400000" scaled="1"/>
+        </a:gradFill>
+        <a:effectLst/>
+      </p:bgPr>
+    </p:bg>
+    <p:spTree>
+      <p:nvGrpSpPr>
+        <p:cNvPr id="1" name=""/>
+        <p:cNvGrpSpPr/>
+        <p:nvPr/>
+      </p:nvGrpSpPr>
+      <p:grpSpPr>
+        <a:xfrm>
+          <a:off x="0" y="0"/>
+          <a:ext cx="0" cy="0"/>
+          <a:chOff x="0" y="0"/>
+          <a:chExt cx="0" cy="0"/>
+        </a:xfrm>
+      </p:grpSpPr>
+      <p:sp>
+        <p:nvSpPr>
+          <p:cNvPr id="2" name="Title 1"/>
+          <p:cNvSpPr>
+            <a:spLocks noGrp="1"/>
+          </p:cNvSpPr>
+          <p:nvPr>
+            <p:ph type="title"/>
+          </p:nvPr>
+        </p:nvSpPr>
+        <p:spPr>
+          <a:xfrm>
+            <a:off x="723130" y="784994"/>
+            <a:ext cx="10515600" cy="4689683"/>
+          </a:xfrm>
+        </p:spPr>
+        <p:txBody>
+          <a:bodyPr>
+            <a:normAutofit/>
+          </a:bodyPr>
+          <a:lstStyle/>
+          <a:p>
+            <a:pPr algn="ctr"/>
+            <a:r>
+              <a:rPr lang="en-US" dirty="0"/>
+              <a:t>Thanks for attention</a:t>
+            </a:r>
+            <a:br>
+              <a:rPr lang="en-US" dirty="0"/>
+            </a:br>
+            <a:br>
+              <a:rPr lang="en-US" dirty="0"/>
+            </a:br>
+            <a:r>
+              <a:rPr lang="en-US" dirty="0"/>
+              <a:t>Evgeniy </a:t>
+            </a:r>
+            <a:r>
+              <a:rPr lang="en-US" dirty="0" err="1"/>
+              <a:t>Pilyaev</a:t>
+            </a:r>
+            <a:br>
+              <a:rPr lang="en-US" dirty="0"/>
+            </a:br>
+            <a:br>
+              <a:rPr lang="en-US" dirty="0"/>
+            </a:br>
+            <a:r>
+              <a:rPr lang="en-US" dirty="0">
+                <a:hlinkClick r:id="rId3"/>
+              </a:rPr>
+              <a:t>https://github.com/EPilyaev/ASPNetCoreMVC</a:t>
+            </a:r>
+            <a:br>
+              <a:rPr lang="en-US" dirty="0"/>
+            </a:br>
+            <a:br>
+              <a:rPr lang="en-US" dirty="0"/>
+            </a:br>
+            <a:r>
+              <a:rPr lang="en-US" dirty="0"/>
+              <a:t>(</a:t>
+            </a:r>
+            <a:r>
+              <a:rPr lang="en-US" dirty="0" err="1"/>
+              <a:t>Host&amp;Startup&amp;Di</a:t>
+            </a:r>
+            <a:r>
+              <a:rPr lang="en-US" dirty="0"/>
+              <a:t> presentation)</a:t>
+            </a:r>
+          </a:p>
+        </p:txBody>
+      </p:sp>
+    </p:spTree>
+    <p:extLst>
+      <p:ext uri="{BB962C8B-B14F-4D97-AF65-F5344CB8AC3E}">
+        <p14:creationId xmlns:p14="http://schemas.microsoft.com/office/powerpoint/2010/main" val="979259589"/>
+      </p:ext>
+    </p:extLst>
+  </p:cSld>
+  <p:clrMapOvr>
+    <a:masterClrMapping/>
+  </p:clrMapOvr>
+</p:sld>
+</file>
+
+<file path=ppt/slides/slide3.xml><?xml version="1.0" encoding="utf-8"?>
+<p:sld xmlns:a="http://schemas.openxmlformats.org/drawingml/2006/main" xmlns:r="http://schemas.openxmlformats.org/officeDocument/2006/relationships" xmlns:p="http://schemas.openxmlformats.org/presentationml/2006/main">
+  <p:cSld>
+    <p:bg>
+      <p:bgPr>
+        <a:gradFill>
+          <a:gsLst>
+            <a:gs pos="0">
+              <a:schemeClr val="accent1">
+                <a:lumMod val="5000"/>
+                <a:lumOff val="95000"/>
+              </a:schemeClr>
+            </a:gs>
+            <a:gs pos="42000">
+              <a:schemeClr val="accent1">
+                <a:lumMod val="45000"/>
+                <a:lumOff val="55000"/>
+              </a:schemeClr>
+            </a:gs>
+            <a:gs pos="83000">
+              <a:schemeClr val="accent1">
+                <a:lumMod val="45000"/>
+                <a:lumOff val="55000"/>
+              </a:schemeClr>
+            </a:gs>
+            <a:gs pos="100000">
+              <a:schemeClr val="accent1">
+                <a:lumMod val="30000"/>
+                <a:lumOff val="70000"/>
+              </a:schemeClr>
+            </a:gs>
+          </a:gsLst>
+          <a:lin ang="5400000" scaled="1"/>
+        </a:gradFill>
+        <a:effectLst/>
+      </p:bgPr>
+    </p:bg>
+    <p:spTree>
+      <p:nvGrpSpPr>
+        <p:cNvPr id="1" name=""/>
+        <p:cNvGrpSpPr/>
+        <p:nvPr/>
+      </p:nvGrpSpPr>
+      <p:grpSpPr>
+        <a:xfrm>
+          <a:off x="0" y="0"/>
+          <a:ext cx="0" cy="0"/>
+          <a:chOff x="0" y="0"/>
+          <a:chExt cx="0" cy="0"/>
+        </a:xfrm>
+      </p:grpSpPr>
+      <p:sp>
+        <p:nvSpPr>
+          <p:cNvPr id="2" name="Title 1"/>
+          <p:cNvSpPr>
+            <a:spLocks noGrp="1"/>
+          </p:cNvSpPr>
+          <p:nvPr>
+            <p:ph type="title"/>
+          </p:nvPr>
+        </p:nvSpPr>
+        <p:spPr/>
+        <p:txBody>
+          <a:bodyPr/>
+          <a:lstStyle/>
+          <a:p>
+            <a:r>
+              <a:rPr lang="en-US" dirty="0"/>
+              <a:t>Host</a:t>
+            </a:r>
+          </a:p>
+        </p:txBody>
+      </p:sp>
+      <p:sp>
+        <p:nvSpPr>
+          <p:cNvPr id="3" name="Content Placeholder 2"/>
+          <p:cNvSpPr>
+            <a:spLocks noGrp="1"/>
+          </p:cNvSpPr>
+          <p:nvPr>
+            <p:ph idx="1"/>
+          </p:nvPr>
+        </p:nvSpPr>
+        <p:spPr>
+          <a:xfrm>
+            <a:off x="720968" y="1690688"/>
+            <a:ext cx="11131063" cy="4351338"/>
+          </a:xfrm>
+        </p:spPr>
+        <p:txBody>
+          <a:bodyPr>
+            <a:noAutofit/>
+          </a:bodyPr>
+          <a:lstStyle/>
+          <a:p>
+            <a:pPr marL="0" indent="0">
+              <a:buNone/>
+            </a:pPr>
+            <a:r>
+              <a:rPr lang="en-US" sz="3200" dirty="0"/>
+              <a:t>Provides lifetime management. </a:t>
+            </a:r>
+          </a:p>
+          <a:p>
+            <a:pPr marL="0" indent="0">
+              <a:buNone/>
+            </a:pPr>
+            <a:endParaRPr lang="en-US" sz="3200" dirty="0"/>
+          </a:p>
+          <a:p>
+            <a:pPr marL="0" indent="0">
+              <a:buNone/>
+            </a:pPr>
+            <a:r>
+              <a:rPr lang="en-US" sz="3200" dirty="0"/>
+              <a:t>Startup: </a:t>
+            </a:r>
+          </a:p>
+          <a:p>
+            <a:pPr marL="0" indent="0">
+              <a:buNone/>
+            </a:pPr>
+            <a:r>
+              <a:rPr lang="en-US" dirty="0"/>
+              <a:t>Calls </a:t>
+            </a:r>
+            <a:r>
+              <a:rPr lang="en-US" dirty="0" err="1"/>
+              <a:t>IHostedService.StartAsync</a:t>
+            </a:r>
+            <a:r>
+              <a:rPr lang="en-US" dirty="0"/>
+              <a:t> on each implementation of </a:t>
+            </a:r>
+            <a:r>
+              <a:rPr lang="en-US" dirty="0" err="1"/>
+              <a:t>IHostedService</a:t>
+            </a:r>
+            <a:r>
+              <a:rPr lang="en-US" dirty="0"/>
+              <a:t>. In a web app – starts an HTTP server implementation.</a:t>
+            </a:r>
+          </a:p>
+          <a:p>
+            <a:pPr marL="0" indent="0">
+              <a:buNone/>
+            </a:pPr>
+            <a:endParaRPr lang="en-US" sz="3200" dirty="0"/>
+          </a:p>
+          <a:p>
+            <a:pPr marL="0" indent="0">
+              <a:buNone/>
+            </a:pPr>
+            <a:r>
+              <a:rPr lang="en-US" sz="3200" dirty="0"/>
+              <a:t>Graceful shutdown.</a:t>
+            </a:r>
+          </a:p>
+        </p:txBody>
+      </p:sp>
+    </p:spTree>
+    <p:extLst>
+      <p:ext uri="{BB962C8B-B14F-4D97-AF65-F5344CB8AC3E}">
+        <p14:creationId xmlns:p14="http://schemas.microsoft.com/office/powerpoint/2010/main" val="1943586752"/>
+      </p:ext>
+    </p:extLst>
+  </p:cSld>
+  <p:clrMapOvr>
+    <a:masterClrMapping/>
+  </p:clrMapOvr>
+</p:sld>
+</file>
+
+<file path=ppt/slides/slide4.xml><?xml version="1.0" encoding="utf-8"?>
+<p:sld xmlns:a="http://schemas.openxmlformats.org/drawingml/2006/main" xmlns:r="http://schemas.openxmlformats.org/officeDocument/2006/relationships" xmlns:p="http://schemas.openxmlformats.org/presentationml/2006/main">
+  <p:cSld>
+    <p:bg>
+      <p:bgPr>
+        <a:gradFill>
+          <a:gsLst>
+            <a:gs pos="0">
+              <a:schemeClr val="accent1">
+                <a:lumMod val="5000"/>
+                <a:lumOff val="95000"/>
+              </a:schemeClr>
+            </a:gs>
+            <a:gs pos="42000">
+              <a:schemeClr val="accent1">
+                <a:lumMod val="45000"/>
+                <a:lumOff val="55000"/>
+              </a:schemeClr>
+            </a:gs>
+            <a:gs pos="83000">
+              <a:schemeClr val="accent1">
+                <a:lumMod val="45000"/>
+                <a:lumOff val="55000"/>
+              </a:schemeClr>
+            </a:gs>
+            <a:gs pos="100000">
+              <a:schemeClr val="accent1">
+                <a:lumMod val="30000"/>
+                <a:lumOff val="70000"/>
+              </a:schemeClr>
+            </a:gs>
+          </a:gsLst>
+          <a:lin ang="5400000" scaled="1"/>
+        </a:gradFill>
+        <a:effectLst/>
+      </p:bgPr>
+    </p:bg>
+    <p:spTree>
+      <p:nvGrpSpPr>
+        <p:cNvPr id="1" name=""/>
+        <p:cNvGrpSpPr/>
+        <p:nvPr/>
+      </p:nvGrpSpPr>
+      <p:grpSpPr>
+        <a:xfrm>
+          <a:off x="0" y="0"/>
+          <a:ext cx="0" cy="0"/>
+          <a:chOff x="0" y="0"/>
+          <a:chExt cx="0" cy="0"/>
+        </a:xfrm>
+      </p:grpSpPr>
+      <p:sp>
+        <p:nvSpPr>
+          <p:cNvPr id="2" name="Title 1"/>
+          <p:cNvSpPr>
+            <a:spLocks noGrp="1"/>
+          </p:cNvSpPr>
+          <p:nvPr>
+            <p:ph type="title"/>
+          </p:nvPr>
+        </p:nvSpPr>
+        <p:spPr/>
+        <p:txBody>
+          <a:bodyPr/>
+          <a:lstStyle/>
+          <a:p>
+            <a:r>
+              <a:rPr lang="en-US" dirty="0"/>
+              <a:t>Host</a:t>
+            </a:r>
+          </a:p>
+        </p:txBody>
+      </p:sp>
+      <p:sp>
+        <p:nvSpPr>
+          <p:cNvPr id="3" name="Content Placeholder 2"/>
+          <p:cNvSpPr>
+            <a:spLocks noGrp="1"/>
+          </p:cNvSpPr>
+          <p:nvPr>
+            <p:ph idx="1"/>
+          </p:nvPr>
+        </p:nvSpPr>
+        <p:spPr>
+          <a:xfrm>
+            <a:off x="838200" y="2506662"/>
+            <a:ext cx="11166231" cy="4351338"/>
+          </a:xfrm>
+        </p:spPr>
+        <p:txBody>
+          <a:bodyPr>
+            <a:normAutofit/>
+          </a:bodyPr>
+          <a:lstStyle/>
+          <a:p>
+            <a:pPr marL="0" indent="0">
+              <a:buNone/>
+            </a:pPr>
+            <a:r>
+              <a:rPr lang="en-US" sz="3200" dirty="0"/>
+              <a:t>Generic Host – recommended.</a:t>
+            </a:r>
+          </a:p>
+          <a:p>
+            <a:pPr marL="0" indent="0">
+              <a:buNone/>
+            </a:pPr>
+            <a:endParaRPr lang="en-US" sz="3200" dirty="0"/>
+          </a:p>
+          <a:p>
+            <a:pPr marL="0" indent="0">
+              <a:buNone/>
+            </a:pPr>
+            <a:r>
+              <a:rPr lang="en-US" sz="3200" dirty="0"/>
+              <a:t>Web Host – not recommended, backward compatibility. Used for 			  HTTP workloads before </a:t>
+            </a:r>
+            <a:r>
+              <a:rPr lang="en-US" sz="3200" dirty="0" err="1"/>
+              <a:t>.Net</a:t>
+            </a:r>
+            <a:r>
+              <a:rPr lang="en-US" sz="3200" dirty="0"/>
+              <a:t> Core 3.0.</a:t>
+            </a:r>
+          </a:p>
+        </p:txBody>
+      </p:sp>
+    </p:spTree>
+    <p:extLst>
+      <p:ext uri="{BB962C8B-B14F-4D97-AF65-F5344CB8AC3E}">
+        <p14:creationId xmlns:p14="http://schemas.microsoft.com/office/powerpoint/2010/main" val="3752328964"/>
+      </p:ext>
+    </p:extLst>
+  </p:cSld>
+  <p:clrMapOvr>
+    <a:masterClrMapping/>
+  </p:clrMapOvr>
+</p:sld>
+</file>
+
+<file path=ppt/slides/slide5.xml><?xml version="1.0" encoding="utf-8"?>
+<p:sld xmlns:a="http://schemas.openxmlformats.org/drawingml/2006/main" xmlns:r="http://schemas.openxmlformats.org/officeDocument/2006/relationships" xmlns:p="http://schemas.openxmlformats.org/presentationml/2006/main">
+  <p:cSld>
+    <p:bg>
+      <p:bgPr>
+        <a:gradFill>
+          <a:gsLst>
+            <a:gs pos="0">
+              <a:schemeClr val="accent1">
+                <a:lumMod val="5000"/>
+                <a:lumOff val="95000"/>
+              </a:schemeClr>
+            </a:gs>
+            <a:gs pos="42000">
+              <a:schemeClr val="accent1">
+                <a:lumMod val="45000"/>
+                <a:lumOff val="55000"/>
+              </a:schemeClr>
+            </a:gs>
+            <a:gs pos="83000">
+              <a:schemeClr val="accent1">
+                <a:lumMod val="45000"/>
+                <a:lumOff val="55000"/>
+              </a:schemeClr>
+            </a:gs>
+            <a:gs pos="100000">
+              <a:schemeClr val="accent1">
+                <a:lumMod val="30000"/>
+                <a:lumOff val="70000"/>
+              </a:schemeClr>
+            </a:gs>
+          </a:gsLst>
+          <a:lin ang="5400000" scaled="1"/>
+        </a:gradFill>
+        <a:effectLst/>
+      </p:bgPr>
+    </p:bg>
+    <p:spTree>
+      <p:nvGrpSpPr>
+        <p:cNvPr id="1" name=""/>
+        <p:cNvGrpSpPr/>
+        <p:nvPr/>
+      </p:nvGrpSpPr>
+      <p:grpSpPr>
+        <a:xfrm>
+          <a:off x="0" y="0"/>
+          <a:ext cx="0" cy="0"/>
+          <a:chOff x="0" y="0"/>
+          <a:chExt cx="0" cy="0"/>
+        </a:xfrm>
+      </p:grpSpPr>
+      <p:sp>
+        <p:nvSpPr>
+          <p:cNvPr id="2" name="Title 1"/>
+          <p:cNvSpPr>
+            <a:spLocks noGrp="1"/>
+          </p:cNvSpPr>
+          <p:nvPr>
+            <p:ph type="title"/>
+          </p:nvPr>
+        </p:nvSpPr>
+        <p:spPr>
+          <a:xfrm>
+            <a:off x="181708" y="60325"/>
+            <a:ext cx="10515600" cy="1325563"/>
+          </a:xfrm>
+        </p:spPr>
+        <p:txBody>
+          <a:bodyPr/>
+          <a:lstStyle/>
+          <a:p>
+            <a:r>
+              <a:rPr lang="en-US" dirty="0"/>
+              <a:t>Generic Host (non-http workload)</a:t>
+            </a:r>
           </a:p>
         </p:txBody>
       </p:sp>
@@ -5395,13 +7779,6 @@
   <p:clrMapOvr>
     <a:masterClrMapping/>
   </p:clrMapOvr>
-  <p:timing>
-    <p:tnLst>
-      <p:par>
-        <p:cTn id="1" dur="indefinite" restart="never" nodeType="tmRoot"/>
-      </p:par>
-    </p:tnLst>
-  </p:timing>
 </p:sld>
 </file>
 
@@ -5477,14 +7854,13 @@
           <a:lstStyle/>
           <a:p>
             <a:r>
-              <a:rPr lang="en-US" dirty="0" err="1" smtClean="0"/>
+              <a:rPr lang="en-US" dirty="0" err="1"/>
               <a:t>IHostedService</a:t>
             </a:r>
             <a:r>
-              <a:rPr lang="en-US" dirty="0" smtClean="0"/>
+              <a:rPr lang="en-US" dirty="0"/>
               <a:t> implementation</a:t>
             </a:r>
-            <a:endParaRPr lang="en-US" dirty="0"/>
           </a:p>
         </p:txBody>
       </p:sp>
@@ -5522,13 +7898,6 @@
   <p:clrMapOvr>
     <a:masterClrMapping/>
   </p:clrMapOvr>
-  <p:timing>
-    <p:tnLst>
-      <p:par>
-        <p:cTn id="1" dur="indefinite" restart="never" nodeType="tmRoot"/>
-      </p:par>
-    </p:tnLst>
-  </p:timing>
 </p:sld>
 </file>
 
@@ -5599,14 +7968,9 @@
           <a:lstStyle/>
           <a:p>
             <a:r>
-              <a:rPr lang="en-US" dirty="0" smtClean="0"/>
-              <a:t>Generic </a:t>
-            </a:r>
-            <a:r>
-              <a:rPr lang="en-US" dirty="0" smtClean="0"/>
-              <a:t>Host (web)</a:t>
-            </a:r>
-            <a:endParaRPr lang="en-US" dirty="0"/>
+              <a:rPr lang="en-US" dirty="0"/>
+              <a:t>Generic Host (web)</a:t>
+            </a:r>
           </a:p>
         </p:txBody>
       </p:sp>
@@ -5644,13 +8008,6 @@
   <p:clrMapOvr>
     <a:masterClrMapping/>
   </p:clrMapOvr>
-  <p:timing>
-    <p:tnLst>
-      <p:par>
-        <p:cTn id="1" dur="indefinite" restart="never" nodeType="tmRoot"/>
-      </p:par>
-    </p:tnLst>
-  </p:timing>
 </p:sld>
 </file>
 
@@ -5726,18 +8083,17 @@
           <a:lstStyle/>
           <a:p>
             <a:r>
-              <a:rPr lang="en-US" dirty="0" smtClean="0"/>
+              <a:rPr lang="en-US" dirty="0"/>
               <a:t>(Create)</a:t>
             </a:r>
             <a:r>
-              <a:rPr lang="en-US" dirty="0" err="1" smtClean="0"/>
+              <a:rPr lang="en-US" dirty="0" err="1"/>
               <a:t>DefaultBuilder</a:t>
             </a:r>
             <a:r>
-              <a:rPr lang="en-US" dirty="0" smtClean="0"/>
+              <a:rPr lang="en-US" dirty="0"/>
               <a:t> settings:</a:t>
             </a:r>
-            <a:endParaRPr lang="en-US" dirty="0"/>
           </a:p>
         </p:txBody>
       </p:sp>
@@ -5768,15 +8124,15 @@
               <a:buChar char="•"/>
             </a:pPr>
             <a:r>
-              <a:rPr lang="en-US" sz="2400" dirty="0" smtClean="0"/>
+              <a:rPr lang="en-US" sz="2400" dirty="0"/>
               <a:t>Content root = </a:t>
             </a:r>
             <a:r>
-              <a:rPr lang="en-US" sz="2400" dirty="0" err="1" smtClean="0"/>
+              <a:rPr lang="en-US" sz="2400" dirty="0" err="1"/>
               <a:t>GetCurrentDirectory</a:t>
             </a:r>
             <a:r>
-              <a:rPr lang="en-US" sz="2400" dirty="0" smtClean="0"/>
+              <a:rPr lang="en-US" sz="2400" dirty="0"/>
               <a:t>()</a:t>
             </a:r>
           </a:p>
@@ -5785,7 +8141,7 @@
               <a:buFont typeface="Arial" panose="020B0604020202020204" pitchFamily="34" charset="0"/>
               <a:buChar char="•"/>
             </a:pPr>
-            <a:endParaRPr lang="en-US" sz="2400" dirty="0" smtClean="0"/>
+            <a:endParaRPr lang="en-US" sz="2400" dirty="0"/>
           </a:p>
           <a:p>
             <a:pPr marL="285750" indent="-285750">
@@ -5793,37 +8149,24 @@
               <a:buChar char="•"/>
             </a:pPr>
             <a:r>
-              <a:rPr lang="en-US" sz="2400" dirty="0" smtClean="0"/>
+              <a:rPr lang="en-US" sz="2400" dirty="0"/>
               <a:t>Loads host configuration from:</a:t>
             </a:r>
+          </a:p>
+          <a:p>
+            <a:r>
+              <a:rPr lang="en-US" sz="2400" dirty="0"/>
+              <a:t>	Environment variables prefixed with "DOTNET_".</a:t>
+            </a:r>
+          </a:p>
+          <a:p>
+            <a:r>
+              <a:rPr lang="en-US" sz="2400" dirty="0"/>
+              <a:t>	Command-line arguments.</a:t>
+            </a:r>
+          </a:p>
+          <a:p>
             <a:endParaRPr lang="en-US" sz="2400" dirty="0"/>
-          </a:p>
-          <a:p>
-            <a:r>
-              <a:rPr lang="en-US" sz="2400" dirty="0" smtClean="0"/>
-              <a:t>	Environment </a:t>
-            </a:r>
-            <a:r>
-              <a:rPr lang="en-US" sz="2400" dirty="0"/>
-              <a:t>variables prefixed with "DOTNET_".</a:t>
-            </a:r>
-          </a:p>
-          <a:p>
-            <a:r>
-              <a:rPr lang="en-US" sz="2400" dirty="0" smtClean="0"/>
-              <a:t>	Command-line </a:t>
-            </a:r>
-            <a:r>
-              <a:rPr lang="en-US" sz="2400" dirty="0"/>
-              <a:t>arguments</a:t>
-            </a:r>
-            <a:r>
-              <a:rPr lang="en-US" sz="2400" dirty="0" smtClean="0"/>
-              <a:t>.</a:t>
-            </a:r>
-          </a:p>
-          <a:p>
-            <a:endParaRPr lang="en-US" sz="2400" dirty="0" smtClean="0"/>
           </a:p>
           <a:p>
             <a:pPr marL="285750" indent="-285750">
@@ -5832,17 +8175,13 @@
             </a:pPr>
             <a:r>
               <a:rPr lang="en-US" sz="2400" dirty="0"/>
-              <a:t>Loads app configuration from</a:t>
-            </a:r>
-            <a:r>
-              <a:rPr lang="en-US" sz="2400" dirty="0" smtClean="0"/>
-              <a:t>:</a:t>
+              <a:t>Loads app configuration from:</a:t>
             </a:r>
           </a:p>
           <a:p>
             <a:pPr lvl="2"/>
             <a:r>
-              <a:rPr lang="en-US" sz="2400" dirty="0" err="1" smtClean="0"/>
+              <a:rPr lang="en-US" sz="2400" dirty="0" err="1"/>
               <a:t>appsettings.json</a:t>
             </a:r>
             <a:r>
@@ -5887,11 +8226,7 @@
             <a:pPr lvl="2"/>
             <a:r>
               <a:rPr lang="en-US" sz="2400" dirty="0"/>
-              <a:t>Command-line </a:t>
-            </a:r>
-            <a:r>
-              <a:rPr lang="en-US" sz="2400" dirty="0" smtClean="0"/>
-              <a:t>arguments.</a:t>
+              <a:t>Command-line arguments.</a:t>
             </a:r>
           </a:p>
         </p:txBody>
@@ -5906,13 +8241,6 @@
   <p:clrMapOvr>
     <a:masterClrMapping/>
   </p:clrMapOvr>
-  <p:timing>
-    <p:tnLst>
-      <p:par>
-        <p:cTn id="1" dur="indefinite" restart="never" nodeType="tmRoot"/>
-      </p:par>
-    </p:tnLst>
-  </p:timing>
 </p:sld>
 </file>
 
@@ -5988,18 +8316,17 @@
           <a:lstStyle/>
           <a:p>
             <a:r>
-              <a:rPr lang="en-US" dirty="0" smtClean="0"/>
+              <a:rPr lang="en-US" dirty="0"/>
               <a:t>(Create)</a:t>
             </a:r>
             <a:r>
-              <a:rPr lang="en-US" dirty="0" err="1" smtClean="0"/>
+              <a:rPr lang="en-US" dirty="0" err="1"/>
               <a:t>DefaultBuilder</a:t>
             </a:r>
             <a:r>
-              <a:rPr lang="en-US" dirty="0" smtClean="0"/>
+              <a:rPr lang="en-US" dirty="0"/>
               <a:t> settings:</a:t>
             </a:r>
-            <a:endParaRPr lang="en-US" dirty="0"/>
           </a:p>
         </p:txBody>
       </p:sp>
@@ -6030,12 +8357,20 @@
               <a:buChar char="•"/>
             </a:pPr>
             <a:r>
-              <a:rPr lang="en-US" sz="2400" dirty="0" smtClean="0"/>
-              <a:t>Adds </a:t>
-            </a:r>
-            <a:r>
               <a:rPr lang="en-US" sz="2400" dirty="0"/>
-              <a:t>following logging providers:</a:t>
+              <a:t>Adds following logging providers:</a:t>
+            </a:r>
+          </a:p>
+          <a:p>
+            <a:r>
+              <a:rPr lang="en-US" sz="2400" dirty="0"/>
+              <a:t>	Console</a:t>
+            </a:r>
+          </a:p>
+          <a:p>
+            <a:r>
+              <a:rPr lang="en-US" sz="2400" dirty="0"/>
+              <a:t>	Debug</a:t>
             </a:r>
           </a:p>
           <a:p>
@@ -6044,9 +8379,10 @@
               <a:t>	</a:t>
             </a:r>
             <a:r>
-              <a:rPr lang="en-US" sz="2400" dirty="0" smtClean="0"/>
-              <a:t>Console</a:t>
-            </a:r>
+              <a:rPr lang="en-US" sz="2400" dirty="0" err="1"/>
+              <a:t>EventSource</a:t>
+            </a:r>
+            <a:endParaRPr lang="en-US" sz="2400" dirty="0"/>
           </a:p>
           <a:p>
             <a:r>
@@ -6054,41 +8390,12 @@
               <a:t>	</a:t>
             </a:r>
             <a:r>
-              <a:rPr lang="en-US" sz="2400" dirty="0" smtClean="0"/>
-              <a:t>Debug</a:t>
-            </a:r>
-          </a:p>
-          <a:p>
+              <a:rPr lang="en-US" sz="2400" dirty="0" err="1"/>
+              <a:t>EventLog</a:t>
+            </a:r>
             <a:r>
               <a:rPr lang="en-US" sz="2400" dirty="0"/>
-              <a:t>	</a:t>
-            </a:r>
-            <a:r>
-              <a:rPr lang="en-US" sz="2400" dirty="0" err="1" smtClean="0"/>
-              <a:t>EventSource</a:t>
-            </a:r>
-            <a:endParaRPr lang="en-US" sz="2400" dirty="0" smtClean="0"/>
-          </a:p>
-          <a:p>
-            <a:r>
-              <a:rPr lang="en-US" sz="2400" dirty="0"/>
-              <a:t>	</a:t>
-            </a:r>
-            <a:r>
-              <a:rPr lang="en-US" sz="2400" dirty="0" err="1" smtClean="0"/>
-              <a:t>EventLog</a:t>
-            </a:r>
-            <a:r>
-              <a:rPr lang="en-US" sz="2400" dirty="0" smtClean="0"/>
-              <a:t> </a:t>
-            </a:r>
-            <a:r>
-              <a:rPr lang="en-US" sz="2400" dirty="0"/>
-              <a:t>(Windows</a:t>
-            </a:r>
-            <a:r>
-              <a:rPr lang="en-US" sz="2400" dirty="0" smtClean="0"/>
-              <a:t>)</a:t>
+              <a:t> (Windows)</a:t>
             </a:r>
           </a:p>
           <a:p>
@@ -6106,7 +8413,6 @@
               <a:rPr lang="en-US" sz="2400" dirty="0"/>
               <a:t>Enables scope validation and dependency validation when the environment is Development.</a:t>
             </a:r>
-            <a:endParaRPr lang="en-US" sz="2400" dirty="0"/>
           </a:p>
         </p:txBody>
       </p:sp>
@@ -6120,13 +8426,6 @@
   <p:clrMapOvr>
     <a:masterClrMapping/>
   </p:clrMapOvr>
-  <p:timing>
-    <p:tnLst>
-      <p:par>
-        <p:cTn id="1" dur="indefinite" restart="never" nodeType="tmRoot"/>
-      </p:par>
-    </p:tnLst>
-  </p:timing>
 </p:sld>
 </file>
 

</xml_diff>